<commit_message>
Improved the derivation of the Component interface
</commit_message>
<xml_diff>
--- a/Derivation of Component.pptx
+++ b/Derivation of Component.pptx
@@ -26,8 +26,12 @@
     <p:sldId id="278" r:id="rId20"/>
     <p:sldId id="279" r:id="rId21"/>
     <p:sldId id="266" r:id="rId22"/>
-    <p:sldId id="267" r:id="rId23"/>
-    <p:sldId id="268" r:id="rId24"/>
+    <p:sldId id="280" r:id="rId23"/>
+    <p:sldId id="282" r:id="rId24"/>
+    <p:sldId id="281" r:id="rId25"/>
+    <p:sldId id="283" r:id="rId26"/>
+    <p:sldId id="267" r:id="rId27"/>
+    <p:sldId id="268" r:id="rId28"/>
   </p:sldIdLst>
   <p:sldSz cx="9144000" cy="6858000" type="screen4x3"/>
   <p:notesSz cx="6858000" cy="9144000"/>
@@ -310,7 +314,7 @@
           <a:p>
             <a:fld id="{3D636C07-7E76-46D3-B86B-6AF7C60E533E}" type="datetimeFigureOut">
               <a:rPr lang="nl-NL" smtClean="0"/>
-              <a:t>17-8-2015</a:t>
+              <a:t>13-10-2015</a:t>
             </a:fld>
             <a:endParaRPr lang="nl-NL"/>
           </a:p>
@@ -475,7 +479,7 @@
           <a:p>
             <a:fld id="{3D636C07-7E76-46D3-B86B-6AF7C60E533E}" type="datetimeFigureOut">
               <a:rPr lang="nl-NL" smtClean="0"/>
-              <a:t>17-8-2015</a:t>
+              <a:t>13-10-2015</a:t>
             </a:fld>
             <a:endParaRPr lang="nl-NL"/>
           </a:p>
@@ -650,7 +654,7 @@
           <a:p>
             <a:fld id="{3D636C07-7E76-46D3-B86B-6AF7C60E533E}" type="datetimeFigureOut">
               <a:rPr lang="nl-NL" smtClean="0"/>
-              <a:t>17-8-2015</a:t>
+              <a:t>13-10-2015</a:t>
             </a:fld>
             <a:endParaRPr lang="nl-NL"/>
           </a:p>
@@ -815,7 +819,7 @@
           <a:p>
             <a:fld id="{3D636C07-7E76-46D3-B86B-6AF7C60E533E}" type="datetimeFigureOut">
               <a:rPr lang="nl-NL" smtClean="0"/>
-              <a:t>17-8-2015</a:t>
+              <a:t>13-10-2015</a:t>
             </a:fld>
             <a:endParaRPr lang="nl-NL"/>
           </a:p>
@@ -1056,7 +1060,7 @@
           <a:p>
             <a:fld id="{3D636C07-7E76-46D3-B86B-6AF7C60E533E}" type="datetimeFigureOut">
               <a:rPr lang="nl-NL" smtClean="0"/>
-              <a:t>17-8-2015</a:t>
+              <a:t>13-10-2015</a:t>
             </a:fld>
             <a:endParaRPr lang="nl-NL"/>
           </a:p>
@@ -1339,7 +1343,7 @@
           <a:p>
             <a:fld id="{3D636C07-7E76-46D3-B86B-6AF7C60E533E}" type="datetimeFigureOut">
               <a:rPr lang="nl-NL" smtClean="0"/>
-              <a:t>17-8-2015</a:t>
+              <a:t>13-10-2015</a:t>
             </a:fld>
             <a:endParaRPr lang="nl-NL"/>
           </a:p>
@@ -1756,7 +1760,7 @@
           <a:p>
             <a:fld id="{3D636C07-7E76-46D3-B86B-6AF7C60E533E}" type="datetimeFigureOut">
               <a:rPr lang="nl-NL" smtClean="0"/>
-              <a:t>17-8-2015</a:t>
+              <a:t>13-10-2015</a:t>
             </a:fld>
             <a:endParaRPr lang="nl-NL"/>
           </a:p>
@@ -1869,7 +1873,7 @@
           <a:p>
             <a:fld id="{3D636C07-7E76-46D3-B86B-6AF7C60E533E}" type="datetimeFigureOut">
               <a:rPr lang="nl-NL" smtClean="0"/>
-              <a:t>17-8-2015</a:t>
+              <a:t>13-10-2015</a:t>
             </a:fld>
             <a:endParaRPr lang="nl-NL"/>
           </a:p>
@@ -1959,7 +1963,7 @@
           <a:p>
             <a:fld id="{3D636C07-7E76-46D3-B86B-6AF7C60E533E}" type="datetimeFigureOut">
               <a:rPr lang="nl-NL" smtClean="0"/>
-              <a:t>17-8-2015</a:t>
+              <a:t>13-10-2015</a:t>
             </a:fld>
             <a:endParaRPr lang="nl-NL"/>
           </a:p>
@@ -2231,7 +2235,7 @@
           <a:p>
             <a:fld id="{3D636C07-7E76-46D3-B86B-6AF7C60E533E}" type="datetimeFigureOut">
               <a:rPr lang="nl-NL" smtClean="0"/>
-              <a:t>17-8-2015</a:t>
+              <a:t>13-10-2015</a:t>
             </a:fld>
             <a:endParaRPr lang="nl-NL"/>
           </a:p>
@@ -2479,7 +2483,7 @@
           <a:p>
             <a:fld id="{3D636C07-7E76-46D3-B86B-6AF7C60E533E}" type="datetimeFigureOut">
               <a:rPr lang="nl-NL" smtClean="0"/>
-              <a:t>17-8-2015</a:t>
+              <a:t>13-10-2015</a:t>
             </a:fld>
             <a:endParaRPr lang="nl-NL"/>
           </a:p>
@@ -2687,7 +2691,7 @@
           <a:p>
             <a:fld id="{3D636C07-7E76-46D3-B86B-6AF7C60E533E}" type="datetimeFigureOut">
               <a:rPr lang="nl-NL" smtClean="0"/>
-              <a:t>17-8-2015</a:t>
+              <a:t>13-10-2015</a:t>
             </a:fld>
             <a:endParaRPr lang="nl-NL"/>
           </a:p>
@@ -9696,7 +9700,7 @@
         </p:spPr>
         <p:txBody>
           <a:bodyPr>
-            <a:normAutofit fontScale="92500" lnSpcReduction="10000"/>
+            <a:normAutofit/>
           </a:bodyPr>
           <a:lstStyle/>
           <a:p>
@@ -9704,260 +9708,145 @@
               <a:buNone/>
             </a:pPr>
             <a:r>
-              <a:rPr lang="nl-NL" sz="2800" dirty="0" smtClean="0">
-                <a:solidFill>
-                  <a:srgbClr val="3F7F5F"/>
-                </a:solidFill>
-                <a:latin typeface="Consolas" panose="020B0609020204030204" pitchFamily="49" charset="0"/>
-                <a:cs typeface="Consolas" panose="020B0609020204030204" pitchFamily="49" charset="0"/>
-              </a:rPr>
-              <a:t>// Component is </a:t>
+              <a:rPr lang="nl-NL" sz="2800" b="1" dirty="0" err="1" smtClean="0">
+                <a:solidFill>
+                  <a:srgbClr val="7F0055"/>
+                </a:solidFill>
+                <a:latin typeface="Consolas" panose="020B0609020204030204" pitchFamily="49" charset="0"/>
+                <a:cs typeface="Consolas" panose="020B0609020204030204" pitchFamily="49" charset="0"/>
+              </a:rPr>
+              <a:t>trait</a:t>
+            </a:r>
+            <a:r>
+              <a:rPr lang="nl-NL" sz="2800" dirty="0" smtClean="0">
+                <a:solidFill>
+                  <a:srgbClr val="7F0055"/>
+                </a:solidFill>
+                <a:latin typeface="Consolas" panose="020B0609020204030204" pitchFamily="49" charset="0"/>
+                <a:cs typeface="Consolas" panose="020B0609020204030204" pitchFamily="49" charset="0"/>
+              </a:rPr>
+              <a:t> </a:t>
+            </a:r>
+            <a:r>
+              <a:rPr lang="nl-NL" sz="2800" dirty="0">
+                <a:latin typeface="Consolas" panose="020B0609020204030204" pitchFamily="49" charset="0"/>
+                <a:cs typeface="Consolas" panose="020B0609020204030204" pitchFamily="49" charset="0"/>
+              </a:rPr>
+              <a:t>Component[I, O] {</a:t>
+            </a:r>
+          </a:p>
+          <a:p>
+            <a:pPr marL="0" indent="0">
+              <a:buNone/>
+            </a:pPr>
+            <a:r>
+              <a:rPr lang="nl-NL" sz="2800" dirty="0">
+                <a:latin typeface="Consolas" panose="020B0609020204030204" pitchFamily="49" charset="0"/>
+                <a:cs typeface="Consolas" panose="020B0609020204030204" pitchFamily="49" charset="0"/>
+              </a:rPr>
+              <a:t>  </a:t>
+            </a:r>
+            <a:r>
+              <a:rPr lang="nl-NL" sz="2800" b="1" dirty="0" err="1">
+                <a:solidFill>
+                  <a:srgbClr val="7F0055"/>
+                </a:solidFill>
+                <a:latin typeface="Consolas" panose="020B0609020204030204" pitchFamily="49" charset="0"/>
+                <a:cs typeface="Consolas" panose="020B0609020204030204" pitchFamily="49" charset="0"/>
+              </a:rPr>
+              <a:t>def</a:t>
+            </a:r>
+            <a:r>
+              <a:rPr lang="nl-NL" sz="2800" dirty="0">
+                <a:solidFill>
+                  <a:srgbClr val="7F0055"/>
+                </a:solidFill>
+                <a:latin typeface="Consolas" panose="020B0609020204030204" pitchFamily="49" charset="0"/>
+                <a:cs typeface="Consolas" panose="020B0609020204030204" pitchFamily="49" charset="0"/>
+              </a:rPr>
+              <a:t> </a:t>
+            </a:r>
+            <a:r>
+              <a:rPr lang="nl-NL" sz="2800" dirty="0" smtClean="0">
+                <a:latin typeface="Consolas" panose="020B0609020204030204" pitchFamily="49" charset="0"/>
+                <a:cs typeface="Consolas" panose="020B0609020204030204" pitchFamily="49" charset="0"/>
+              </a:rPr>
+              <a:t>in(i</a:t>
+            </a:r>
+            <a:r>
+              <a:rPr lang="nl-NL" sz="2800" dirty="0">
+                <a:latin typeface="Consolas" panose="020B0609020204030204" pitchFamily="49" charset="0"/>
+                <a:cs typeface="Consolas" panose="020B0609020204030204" pitchFamily="49" charset="0"/>
+              </a:rPr>
+              <a:t>: I</a:t>
+            </a:r>
+            <a:r>
+              <a:rPr lang="nl-NL" sz="2800" dirty="0" smtClean="0">
+                <a:latin typeface="Consolas" panose="020B0609020204030204" pitchFamily="49" charset="0"/>
+                <a:cs typeface="Consolas" panose="020B0609020204030204" pitchFamily="49" charset="0"/>
+              </a:rPr>
+              <a:t>): Unit</a:t>
+            </a:r>
+          </a:p>
+          <a:p>
+            <a:pPr marL="0" indent="0">
+              <a:buNone/>
+            </a:pPr>
+            <a:r>
+              <a:rPr lang="nl-NL" sz="2800" dirty="0">
+                <a:latin typeface="Consolas" panose="020B0609020204030204" pitchFamily="49" charset="0"/>
+                <a:cs typeface="Consolas" panose="020B0609020204030204" pitchFamily="49" charset="0"/>
+              </a:rPr>
+              <a:t> </a:t>
+            </a:r>
+            <a:r>
+              <a:rPr lang="nl-NL" sz="2800" dirty="0" smtClean="0">
+                <a:latin typeface="Consolas" panose="020B0609020204030204" pitchFamily="49" charset="0"/>
+                <a:cs typeface="Consolas" panose="020B0609020204030204" pitchFamily="49" charset="0"/>
+              </a:rPr>
+              <a:t> </a:t>
+            </a:r>
+            <a:r>
+              <a:rPr lang="nl-NL" sz="2800" b="1" dirty="0" err="1">
+                <a:solidFill>
+                  <a:srgbClr val="7F0055"/>
+                </a:solidFill>
+                <a:latin typeface="Consolas" panose="020B0609020204030204" pitchFamily="49" charset="0"/>
+                <a:cs typeface="Consolas" panose="020B0609020204030204" pitchFamily="49" charset="0"/>
+              </a:rPr>
+              <a:t>def</a:t>
+            </a:r>
+            <a:r>
+              <a:rPr lang="nl-NL" sz="2800" dirty="0">
+                <a:solidFill>
+                  <a:srgbClr val="7F0055"/>
+                </a:solidFill>
+                <a:latin typeface="Consolas" panose="020B0609020204030204" pitchFamily="49" charset="0"/>
+                <a:cs typeface="Consolas" panose="020B0609020204030204" pitchFamily="49" charset="0"/>
+              </a:rPr>
+              <a:t> </a:t>
+            </a:r>
+            <a:r>
+              <a:rPr lang="nl-NL" sz="2800" dirty="0" smtClean="0">
+                <a:latin typeface="Consolas" panose="020B0609020204030204" pitchFamily="49" charset="0"/>
+                <a:cs typeface="Consolas" panose="020B0609020204030204" pitchFamily="49" charset="0"/>
+              </a:rPr>
+              <a:t>out: </a:t>
             </a:r>
             <a:r>
               <a:rPr lang="nl-NL" sz="2800" dirty="0" err="1" smtClean="0">
-                <a:solidFill>
-                  <a:srgbClr val="3F7F5F"/>
-                </a:solidFill>
-                <a:latin typeface="Consolas" panose="020B0609020204030204" pitchFamily="49" charset="0"/>
-                <a:cs typeface="Consolas" panose="020B0609020204030204" pitchFamily="49" charset="0"/>
-              </a:rPr>
-              <a:t>actually</a:t>
-            </a:r>
-            <a:r>
-              <a:rPr lang="nl-NL" sz="2800" dirty="0" smtClean="0">
-                <a:solidFill>
-                  <a:srgbClr val="3F7F5F"/>
-                </a:solidFill>
-                <a:latin typeface="Consolas" panose="020B0609020204030204" pitchFamily="49" charset="0"/>
-                <a:cs typeface="Consolas" panose="020B0609020204030204" pitchFamily="49" charset="0"/>
-              </a:rPr>
-              <a:t> a subject!</a:t>
-            </a:r>
-          </a:p>
-          <a:p>
-            <a:pPr marL="0" indent="0">
-              <a:buNone/>
-            </a:pPr>
-            <a:r>
-              <a:rPr lang="nl-NL" sz="2800" b="1" dirty="0" err="1">
-                <a:solidFill>
-                  <a:srgbClr val="7F0055"/>
-                </a:solidFill>
-                <a:latin typeface="Consolas" panose="020B0609020204030204" pitchFamily="49" charset="0"/>
-                <a:cs typeface="Consolas" panose="020B0609020204030204" pitchFamily="49" charset="0"/>
-              </a:rPr>
-              <a:t>trait</a:t>
-            </a:r>
-            <a:r>
-              <a:rPr lang="nl-NL" sz="2800" dirty="0">
-                <a:solidFill>
-                  <a:srgbClr val="7F0055"/>
-                </a:solidFill>
-                <a:latin typeface="Consolas" panose="020B0609020204030204" pitchFamily="49" charset="0"/>
-                <a:cs typeface="Consolas" panose="020B0609020204030204" pitchFamily="49" charset="0"/>
-              </a:rPr>
-              <a:t> </a:t>
-            </a:r>
-            <a:r>
-              <a:rPr lang="nl-NL" sz="2800" dirty="0">
-                <a:latin typeface="Consolas" panose="020B0609020204030204" pitchFamily="49" charset="0"/>
-                <a:cs typeface="Consolas" panose="020B0609020204030204" pitchFamily="49" charset="0"/>
-              </a:rPr>
-              <a:t>Component[I, O</a:t>
-            </a:r>
-            <a:r>
-              <a:rPr lang="nl-NL" sz="2800" dirty="0" smtClean="0">
-                <a:latin typeface="Consolas" panose="020B0609020204030204" pitchFamily="49" charset="0"/>
-                <a:cs typeface="Consolas" panose="020B0609020204030204" pitchFamily="49" charset="0"/>
-              </a:rPr>
-              <a:t>] </a:t>
-            </a:r>
-            <a:r>
-              <a:rPr lang="nl-NL" sz="2800" b="1" dirty="0" err="1" smtClean="0">
-                <a:solidFill>
-                  <a:srgbClr val="7F0055"/>
-                </a:solidFill>
-                <a:latin typeface="Consolas" panose="020B0609020204030204" pitchFamily="49" charset="0"/>
-                <a:cs typeface="Consolas" panose="020B0609020204030204" pitchFamily="49" charset="0"/>
-              </a:rPr>
-              <a:t>extends</a:t>
-            </a:r>
-            <a:r>
-              <a:rPr lang="nl-NL" sz="2800" dirty="0" smtClean="0">
-                <a:latin typeface="Consolas" panose="020B0609020204030204" pitchFamily="49" charset="0"/>
-                <a:cs typeface="Consolas" panose="020B0609020204030204" pitchFamily="49" charset="0"/>
-              </a:rPr>
-              <a:t> </a:t>
-            </a:r>
-            <a:r>
-              <a:rPr lang="nl-NL" sz="2800" dirty="0" err="1" smtClean="0">
-                <a:latin typeface="Consolas" panose="020B0609020204030204" pitchFamily="49" charset="0"/>
-                <a:cs typeface="Consolas" panose="020B0609020204030204" pitchFamily="49" charset="0"/>
-              </a:rPr>
-              <a:t>Observer</a:t>
-            </a:r>
-            <a:r>
-              <a:rPr lang="nl-NL" sz="2800" dirty="0" smtClean="0">
-                <a:latin typeface="Consolas" panose="020B0609020204030204" pitchFamily="49" charset="0"/>
-                <a:cs typeface="Consolas" panose="020B0609020204030204" pitchFamily="49" charset="0"/>
-              </a:rPr>
-              <a:t>[I] {</a:t>
-            </a:r>
-          </a:p>
-          <a:p>
-            <a:pPr marL="0" indent="0">
-              <a:buNone/>
-            </a:pPr>
-            <a:r>
-              <a:rPr lang="nl-NL" sz="2800" b="1" dirty="0" smtClean="0">
-                <a:solidFill>
-                  <a:srgbClr val="7F0055"/>
-                </a:solidFill>
-                <a:latin typeface="Consolas" panose="020B0609020204030204" pitchFamily="49" charset="0"/>
-                <a:cs typeface="Consolas" panose="020B0609020204030204" pitchFamily="49" charset="0"/>
-              </a:rPr>
-              <a:t>  val</a:t>
-            </a:r>
-            <a:r>
-              <a:rPr lang="nl-NL" sz="2800" dirty="0" smtClean="0">
-                <a:latin typeface="Consolas" panose="020B0609020204030204" pitchFamily="49" charset="0"/>
-                <a:cs typeface="Consolas" panose="020B0609020204030204" pitchFamily="49" charset="0"/>
-              </a:rPr>
-              <a:t> </a:t>
-            </a:r>
-            <a:r>
-              <a:rPr lang="nl-NL" sz="2800" dirty="0" smtClean="0">
-                <a:solidFill>
-                  <a:srgbClr val="5E5EFF"/>
-                </a:solidFill>
-                <a:latin typeface="Consolas" panose="020B0609020204030204" pitchFamily="49" charset="0"/>
-                <a:cs typeface="Consolas" panose="020B0609020204030204" pitchFamily="49" charset="0"/>
-              </a:rPr>
-              <a:t>subject</a:t>
-            </a:r>
-            <a:r>
-              <a:rPr lang="nl-NL" sz="2800" dirty="0" smtClean="0">
-                <a:latin typeface="Consolas" panose="020B0609020204030204" pitchFamily="49" charset="0"/>
-                <a:cs typeface="Consolas" panose="020B0609020204030204" pitchFamily="49" charset="0"/>
-              </a:rPr>
-              <a:t> </a:t>
-            </a:r>
-            <a:r>
-              <a:rPr lang="nl-NL" sz="2800" dirty="0">
-                <a:latin typeface="Consolas" panose="020B0609020204030204" pitchFamily="49" charset="0"/>
-                <a:cs typeface="Consolas" panose="020B0609020204030204" pitchFamily="49" charset="0"/>
-              </a:rPr>
-              <a:t>= </a:t>
-            </a:r>
-            <a:r>
-              <a:rPr lang="nl-NL" sz="2800" dirty="0" smtClean="0">
-                <a:latin typeface="Consolas" panose="020B0609020204030204" pitchFamily="49" charset="0"/>
-                <a:cs typeface="Consolas" panose="020B0609020204030204" pitchFamily="49" charset="0"/>
-              </a:rPr>
-              <a:t>Subject[I]</a:t>
-            </a:r>
-          </a:p>
-          <a:p>
-            <a:pPr marL="0" indent="0">
-              <a:buNone/>
-            </a:pPr>
-            <a:r>
-              <a:rPr lang="nl-NL" sz="2800" b="1" dirty="0" smtClean="0">
-                <a:solidFill>
-                  <a:srgbClr val="7F0055"/>
-                </a:solidFill>
-                <a:latin typeface="Consolas" panose="020B0609020204030204" pitchFamily="49" charset="0"/>
-                <a:cs typeface="Consolas" panose="020B0609020204030204" pitchFamily="49" charset="0"/>
-              </a:rPr>
-              <a:t>  </a:t>
-            </a:r>
-            <a:r>
-              <a:rPr lang="nl-NL" sz="2800" b="1" dirty="0">
-                <a:solidFill>
-                  <a:srgbClr val="7F0055"/>
-                </a:solidFill>
-                <a:latin typeface="Consolas" panose="020B0609020204030204" pitchFamily="49" charset="0"/>
-                <a:cs typeface="Consolas" panose="020B0609020204030204" pitchFamily="49" charset="0"/>
-              </a:rPr>
-              <a:t>val</a:t>
-            </a:r>
-            <a:r>
-              <a:rPr lang="nl-NL" sz="2800" dirty="0">
-                <a:latin typeface="Consolas" panose="020B0609020204030204" pitchFamily="49" charset="0"/>
-                <a:cs typeface="Consolas" panose="020B0609020204030204" pitchFamily="49" charset="0"/>
-              </a:rPr>
-              <a:t> </a:t>
-            </a:r>
-            <a:r>
-              <a:rPr lang="nl-NL" sz="2800" dirty="0" err="1" smtClean="0">
-                <a:solidFill>
-                  <a:srgbClr val="5E5EFF"/>
-                </a:solidFill>
-                <a:latin typeface="Consolas" panose="020B0609020204030204" pitchFamily="49" charset="0"/>
-                <a:cs typeface="Consolas" panose="020B0609020204030204" pitchFamily="49" charset="0"/>
-              </a:rPr>
-              <a:t>observable</a:t>
-            </a:r>
-            <a:r>
-              <a:rPr lang="nl-NL" sz="2800" dirty="0" smtClean="0">
-                <a:solidFill>
-                  <a:srgbClr val="5E5EFF"/>
-                </a:solidFill>
-                <a:latin typeface="Consolas" panose="020B0609020204030204" pitchFamily="49" charset="0"/>
-                <a:cs typeface="Consolas" panose="020B0609020204030204" pitchFamily="49" charset="0"/>
-              </a:rPr>
-              <a:t> </a:t>
-            </a:r>
-            <a:r>
-              <a:rPr lang="nl-NL" sz="2800" dirty="0" smtClean="0">
-                <a:latin typeface="Consolas" panose="020B0609020204030204" pitchFamily="49" charset="0"/>
-                <a:cs typeface="Consolas" panose="020B0609020204030204" pitchFamily="49" charset="0"/>
-              </a:rPr>
-              <a:t>= </a:t>
-            </a:r>
-            <a:r>
-              <a:rPr lang="nl-NL" sz="2800" dirty="0" err="1" smtClean="0">
-                <a:solidFill>
-                  <a:srgbClr val="5E5EFF"/>
-                </a:solidFill>
-                <a:latin typeface="Consolas" panose="020B0609020204030204" pitchFamily="49" charset="0"/>
-                <a:cs typeface="Consolas" panose="020B0609020204030204" pitchFamily="49" charset="0"/>
-              </a:rPr>
-              <a:t>subject</a:t>
-            </a:r>
-            <a:r>
-              <a:rPr lang="nl-NL" sz="2800" dirty="0" err="1" smtClean="0">
-                <a:latin typeface="Consolas" panose="020B0609020204030204" pitchFamily="49" charset="0"/>
-                <a:cs typeface="Consolas" panose="020B0609020204030204" pitchFamily="49" charset="0"/>
-              </a:rPr>
-              <a:t>.publish</a:t>
-            </a:r>
-            <a:r>
-              <a:rPr lang="nl-NL" sz="2800" dirty="0" smtClean="0">
-                <a:latin typeface="Consolas" panose="020B0609020204030204" pitchFamily="49" charset="0"/>
-                <a:cs typeface="Consolas" panose="020B0609020204030204" pitchFamily="49" charset="0"/>
-              </a:rPr>
-              <a:t>(</a:t>
-            </a:r>
-            <a:r>
-              <a:rPr lang="nl-NL" sz="2800" dirty="0" err="1" smtClean="0">
-                <a:latin typeface="Consolas" panose="020B0609020204030204" pitchFamily="49" charset="0"/>
-                <a:cs typeface="Consolas" panose="020B0609020204030204" pitchFamily="49" charset="0"/>
-              </a:rPr>
-              <a:t>transform</a:t>
-            </a:r>
-            <a:r>
-              <a:rPr lang="nl-NL" sz="2800" dirty="0" smtClean="0">
-                <a:latin typeface="Consolas" panose="020B0609020204030204" pitchFamily="49" charset="0"/>
-                <a:cs typeface="Consolas" panose="020B0609020204030204" pitchFamily="49" charset="0"/>
-              </a:rPr>
-              <a:t>)</a:t>
-            </a:r>
-          </a:p>
-          <a:p>
-            <a:pPr marL="0" indent="0">
-              <a:buNone/>
-            </a:pPr>
+                <a:latin typeface="Consolas" panose="020B0609020204030204" pitchFamily="49" charset="0"/>
+                <a:cs typeface="Consolas" panose="020B0609020204030204" pitchFamily="49" charset="0"/>
+              </a:rPr>
+              <a:t>Observable</a:t>
+            </a:r>
+            <a:r>
+              <a:rPr lang="nl-NL" sz="2800" dirty="0" smtClean="0">
+                <a:latin typeface="Consolas" panose="020B0609020204030204" pitchFamily="49" charset="0"/>
+                <a:cs typeface="Consolas" panose="020B0609020204030204" pitchFamily="49" charset="0"/>
+              </a:rPr>
+              <a:t>[O]</a:t>
+            </a:r>
             <a:endParaRPr lang="nl-NL" sz="2800" dirty="0">
               <a:latin typeface="Consolas" panose="020B0609020204030204" pitchFamily="49" charset="0"/>
               <a:cs typeface="Consolas" panose="020B0609020204030204" pitchFamily="49" charset="0"/>
@@ -9968,495 +9857,7 @@
               <a:buNone/>
             </a:pPr>
             <a:r>
-              <a:rPr lang="nl-NL" sz="2800" dirty="0">
-                <a:latin typeface="Consolas" panose="020B0609020204030204" pitchFamily="49" charset="0"/>
-                <a:cs typeface="Consolas" panose="020B0609020204030204" pitchFamily="49" charset="0"/>
-              </a:rPr>
-              <a:t>  </a:t>
-            </a:r>
-            <a:r>
-              <a:rPr lang="nl-NL" sz="2800" b="1" dirty="0" err="1">
-                <a:solidFill>
-                  <a:srgbClr val="7F0055"/>
-                </a:solidFill>
-                <a:latin typeface="Consolas" panose="020B0609020204030204" pitchFamily="49" charset="0"/>
-                <a:cs typeface="Consolas" panose="020B0609020204030204" pitchFamily="49" charset="0"/>
-              </a:rPr>
-              <a:t>def</a:t>
-            </a:r>
-            <a:r>
-              <a:rPr lang="nl-NL" sz="2800" dirty="0">
-                <a:solidFill>
-                  <a:srgbClr val="7F0055"/>
-                </a:solidFill>
-                <a:latin typeface="Consolas" panose="020B0609020204030204" pitchFamily="49" charset="0"/>
-                <a:cs typeface="Consolas" panose="020B0609020204030204" pitchFamily="49" charset="0"/>
-              </a:rPr>
-              <a:t> </a:t>
-            </a:r>
-            <a:r>
-              <a:rPr lang="nl-NL" sz="2800" dirty="0" err="1" smtClean="0">
-                <a:latin typeface="Consolas" panose="020B0609020204030204" pitchFamily="49" charset="0"/>
-                <a:cs typeface="Consolas" panose="020B0609020204030204" pitchFamily="49" charset="0"/>
-              </a:rPr>
-              <a:t>transform</a:t>
-            </a:r>
-            <a:r>
-              <a:rPr lang="nl-NL" sz="2800" dirty="0" smtClean="0">
-                <a:latin typeface="Consolas" panose="020B0609020204030204" pitchFamily="49" charset="0"/>
-                <a:cs typeface="Consolas" panose="020B0609020204030204" pitchFamily="49" charset="0"/>
-              </a:rPr>
-              <a:t>(i</a:t>
-            </a:r>
-            <a:r>
-              <a:rPr lang="nl-NL" sz="2800" dirty="0">
-                <a:latin typeface="Consolas" panose="020B0609020204030204" pitchFamily="49" charset="0"/>
-                <a:cs typeface="Consolas" panose="020B0609020204030204" pitchFamily="49" charset="0"/>
-              </a:rPr>
-              <a:t>: </a:t>
-            </a:r>
-            <a:r>
-              <a:rPr lang="nl-NL" sz="2800" dirty="0" err="1" smtClean="0">
-                <a:latin typeface="Consolas" panose="020B0609020204030204" pitchFamily="49" charset="0"/>
-                <a:cs typeface="Consolas" panose="020B0609020204030204" pitchFamily="49" charset="0"/>
-              </a:rPr>
-              <a:t>Observable</a:t>
-            </a:r>
-            <a:r>
-              <a:rPr lang="nl-NL" sz="2800" dirty="0" smtClean="0">
-                <a:latin typeface="Consolas" panose="020B0609020204030204" pitchFamily="49" charset="0"/>
-                <a:cs typeface="Consolas" panose="020B0609020204030204" pitchFamily="49" charset="0"/>
-              </a:rPr>
-              <a:t>[I]): </a:t>
-            </a:r>
-            <a:r>
-              <a:rPr lang="nl-NL" sz="2800" dirty="0" err="1" smtClean="0">
-                <a:latin typeface="Consolas" panose="020B0609020204030204" pitchFamily="49" charset="0"/>
-                <a:cs typeface="Consolas" panose="020B0609020204030204" pitchFamily="49" charset="0"/>
-              </a:rPr>
-              <a:t>Observable</a:t>
-            </a:r>
-            <a:r>
-              <a:rPr lang="nl-NL" sz="2800" dirty="0" smtClean="0">
-                <a:latin typeface="Consolas" panose="020B0609020204030204" pitchFamily="49" charset="0"/>
-                <a:cs typeface="Consolas" panose="020B0609020204030204" pitchFamily="49" charset="0"/>
-              </a:rPr>
-              <a:t>[O]</a:t>
-            </a:r>
-            <a:endParaRPr lang="nl-NL" sz="2800" dirty="0">
-              <a:latin typeface="Consolas" panose="020B0609020204030204" pitchFamily="49" charset="0"/>
-              <a:cs typeface="Consolas" panose="020B0609020204030204" pitchFamily="49" charset="0"/>
-            </a:endParaRPr>
-          </a:p>
-          <a:p>
-            <a:pPr marL="0" indent="0">
-              <a:buNone/>
-            </a:pPr>
-            <a:r>
-              <a:rPr lang="nl-NL" sz="2800" dirty="0">
-                <a:latin typeface="Consolas" panose="020B0609020204030204" pitchFamily="49" charset="0"/>
-                <a:cs typeface="Consolas" panose="020B0609020204030204" pitchFamily="49" charset="0"/>
-              </a:rPr>
-              <a:t>  </a:t>
-            </a:r>
-            <a:r>
-              <a:rPr lang="nl-NL" sz="2800" b="1" dirty="0" err="1">
-                <a:solidFill>
-                  <a:srgbClr val="7F0055"/>
-                </a:solidFill>
-                <a:latin typeface="Consolas" panose="020B0609020204030204" pitchFamily="49" charset="0"/>
-                <a:cs typeface="Consolas" panose="020B0609020204030204" pitchFamily="49" charset="0"/>
-              </a:rPr>
-              <a:t>def</a:t>
-            </a:r>
-            <a:r>
-              <a:rPr lang="nl-NL" sz="2800" dirty="0">
-                <a:solidFill>
-                  <a:srgbClr val="7F0055"/>
-                </a:solidFill>
-                <a:latin typeface="Consolas" panose="020B0609020204030204" pitchFamily="49" charset="0"/>
-                <a:cs typeface="Consolas" panose="020B0609020204030204" pitchFamily="49" charset="0"/>
-              </a:rPr>
-              <a:t> </a:t>
-            </a:r>
-            <a:r>
-              <a:rPr lang="nl-NL" sz="2800" dirty="0" err="1" smtClean="0">
-                <a:latin typeface="Consolas" panose="020B0609020204030204" pitchFamily="49" charset="0"/>
-                <a:cs typeface="Consolas" panose="020B0609020204030204" pitchFamily="49" charset="0"/>
-              </a:rPr>
-              <a:t>asObservable</a:t>
-            </a:r>
-            <a:r>
-              <a:rPr lang="nl-NL" sz="2800" dirty="0" smtClean="0">
-                <a:latin typeface="Consolas" panose="020B0609020204030204" pitchFamily="49" charset="0"/>
-                <a:cs typeface="Consolas" panose="020B0609020204030204" pitchFamily="49" charset="0"/>
-              </a:rPr>
-              <a:t>: </a:t>
-            </a:r>
-            <a:r>
-              <a:rPr lang="nl-NL" sz="2800" dirty="0" err="1">
-                <a:latin typeface="Consolas" panose="020B0609020204030204" pitchFamily="49" charset="0"/>
-                <a:cs typeface="Consolas" panose="020B0609020204030204" pitchFamily="49" charset="0"/>
-              </a:rPr>
-              <a:t>Observable</a:t>
-            </a:r>
-            <a:r>
-              <a:rPr lang="nl-NL" sz="2800" dirty="0">
-                <a:latin typeface="Consolas" panose="020B0609020204030204" pitchFamily="49" charset="0"/>
-                <a:cs typeface="Consolas" panose="020B0609020204030204" pitchFamily="49" charset="0"/>
-              </a:rPr>
-              <a:t>[O</a:t>
-            </a:r>
-            <a:r>
-              <a:rPr lang="nl-NL" sz="2800" dirty="0" smtClean="0">
-                <a:latin typeface="Consolas" panose="020B0609020204030204" pitchFamily="49" charset="0"/>
-                <a:cs typeface="Consolas" panose="020B0609020204030204" pitchFamily="49" charset="0"/>
-              </a:rPr>
-              <a:t>] = </a:t>
-            </a:r>
-            <a:r>
-              <a:rPr lang="nl-NL" sz="2800" dirty="0" err="1" smtClean="0">
-                <a:solidFill>
-                  <a:srgbClr val="5E5EFF"/>
-                </a:solidFill>
-                <a:latin typeface="Consolas" panose="020B0609020204030204" pitchFamily="49" charset="0"/>
-                <a:cs typeface="Consolas" panose="020B0609020204030204" pitchFamily="49" charset="0"/>
-              </a:rPr>
-              <a:t>observable</a:t>
-            </a:r>
-            <a:endParaRPr lang="nl-NL" sz="2800" dirty="0" smtClean="0">
-              <a:latin typeface="Consolas" panose="020B0609020204030204" pitchFamily="49" charset="0"/>
-              <a:cs typeface="Consolas" panose="020B0609020204030204" pitchFamily="49" charset="0"/>
-            </a:endParaRPr>
-          </a:p>
-          <a:p>
-            <a:pPr marL="0" indent="0">
-              <a:buNone/>
-            </a:pPr>
-            <a:endParaRPr lang="nl-NL" sz="2800" dirty="0">
-              <a:latin typeface="Consolas" panose="020B0609020204030204" pitchFamily="49" charset="0"/>
-              <a:cs typeface="Consolas" panose="020B0609020204030204" pitchFamily="49" charset="0"/>
-            </a:endParaRPr>
-          </a:p>
-          <a:p>
-            <a:pPr marL="0" indent="0">
-              <a:buNone/>
-            </a:pPr>
-            <a:r>
-              <a:rPr lang="nl-NL" sz="2800" dirty="0" smtClean="0">
-                <a:latin typeface="Consolas" panose="020B0609020204030204" pitchFamily="49" charset="0"/>
-                <a:cs typeface="Consolas" panose="020B0609020204030204" pitchFamily="49" charset="0"/>
-              </a:rPr>
-              <a:t>  </a:t>
-            </a:r>
-            <a:r>
-              <a:rPr lang="nl-NL" sz="2800" b="1" dirty="0" err="1" smtClean="0">
-                <a:solidFill>
-                  <a:srgbClr val="7F0055"/>
-                </a:solidFill>
-                <a:latin typeface="Consolas" panose="020B0609020204030204" pitchFamily="49" charset="0"/>
-                <a:cs typeface="Consolas" panose="020B0609020204030204" pitchFamily="49" charset="0"/>
-              </a:rPr>
-              <a:t>override</a:t>
-            </a:r>
-            <a:r>
-              <a:rPr lang="nl-NL" sz="2800" b="1" dirty="0" smtClean="0">
-                <a:solidFill>
-                  <a:srgbClr val="7F0055"/>
-                </a:solidFill>
-                <a:latin typeface="Consolas" panose="020B0609020204030204" pitchFamily="49" charset="0"/>
-                <a:cs typeface="Consolas" panose="020B0609020204030204" pitchFamily="49" charset="0"/>
-              </a:rPr>
-              <a:t> </a:t>
-            </a:r>
-            <a:r>
-              <a:rPr lang="nl-NL" sz="2800" b="1" dirty="0" err="1" smtClean="0">
-                <a:solidFill>
-                  <a:srgbClr val="7F0055"/>
-                </a:solidFill>
-                <a:latin typeface="Consolas" panose="020B0609020204030204" pitchFamily="49" charset="0"/>
-                <a:cs typeface="Consolas" panose="020B0609020204030204" pitchFamily="49" charset="0"/>
-              </a:rPr>
-              <a:t>def</a:t>
-            </a:r>
-            <a:r>
-              <a:rPr lang="nl-NL" sz="2800" dirty="0" smtClean="0">
-                <a:solidFill>
-                  <a:srgbClr val="7F0055"/>
-                </a:solidFill>
-                <a:latin typeface="Consolas" panose="020B0609020204030204" pitchFamily="49" charset="0"/>
-                <a:cs typeface="Consolas" panose="020B0609020204030204" pitchFamily="49" charset="0"/>
-              </a:rPr>
-              <a:t> </a:t>
-            </a:r>
-            <a:r>
-              <a:rPr lang="nl-NL" sz="2800" dirty="0" err="1" smtClean="0">
-                <a:latin typeface="Consolas" panose="020B0609020204030204" pitchFamily="49" charset="0"/>
-                <a:cs typeface="Consolas" panose="020B0609020204030204" pitchFamily="49" charset="0"/>
-              </a:rPr>
-              <a:t>onNext</a:t>
-            </a:r>
-            <a:r>
-              <a:rPr lang="nl-NL" sz="2800" dirty="0" smtClean="0">
-                <a:latin typeface="Consolas" panose="020B0609020204030204" pitchFamily="49" charset="0"/>
-                <a:cs typeface="Consolas" panose="020B0609020204030204" pitchFamily="49" charset="0"/>
-              </a:rPr>
-              <a:t>(i: I) = </a:t>
-            </a:r>
-            <a:r>
-              <a:rPr lang="nl-NL" sz="2800" dirty="0" err="1" smtClean="0">
-                <a:solidFill>
-                  <a:srgbClr val="5E5EFF"/>
-                </a:solidFill>
-                <a:latin typeface="Consolas" panose="020B0609020204030204" pitchFamily="49" charset="0"/>
-                <a:cs typeface="Consolas" panose="020B0609020204030204" pitchFamily="49" charset="0"/>
-              </a:rPr>
-              <a:t>subject</a:t>
-            </a:r>
-            <a:r>
-              <a:rPr lang="nl-NL" sz="2800" dirty="0" err="1" smtClean="0">
-                <a:latin typeface="Consolas" panose="020B0609020204030204" pitchFamily="49" charset="0"/>
-                <a:cs typeface="Consolas" panose="020B0609020204030204" pitchFamily="49" charset="0"/>
-              </a:rPr>
-              <a:t>.onNext</a:t>
-            </a:r>
-            <a:r>
-              <a:rPr lang="nl-NL" sz="2800" dirty="0" smtClean="0">
-                <a:latin typeface="Consolas" panose="020B0609020204030204" pitchFamily="49" charset="0"/>
-                <a:cs typeface="Consolas" panose="020B0609020204030204" pitchFamily="49" charset="0"/>
-              </a:rPr>
-              <a:t>(i)</a:t>
-            </a:r>
-          </a:p>
-          <a:p>
-            <a:pPr marL="0" indent="0">
-              <a:buNone/>
-            </a:pPr>
-            <a:r>
-              <a:rPr lang="nl-NL" sz="2800" dirty="0" smtClean="0">
-                <a:latin typeface="Consolas" panose="020B0609020204030204" pitchFamily="49" charset="0"/>
-                <a:cs typeface="Consolas" panose="020B0609020204030204" pitchFamily="49" charset="0"/>
-              </a:rPr>
-              <a:t>  </a:t>
-            </a:r>
-            <a:r>
-              <a:rPr lang="nl-NL" sz="2800" b="1" dirty="0" err="1" smtClean="0">
-                <a:solidFill>
-                  <a:srgbClr val="7F0055"/>
-                </a:solidFill>
-                <a:latin typeface="Consolas" panose="020B0609020204030204" pitchFamily="49" charset="0"/>
-                <a:cs typeface="Consolas" panose="020B0609020204030204" pitchFamily="49" charset="0"/>
-              </a:rPr>
-              <a:t>override</a:t>
-            </a:r>
-            <a:r>
-              <a:rPr lang="nl-NL" sz="2800" b="1" dirty="0" smtClean="0">
-                <a:solidFill>
-                  <a:srgbClr val="7F0055"/>
-                </a:solidFill>
-                <a:latin typeface="Consolas" panose="020B0609020204030204" pitchFamily="49" charset="0"/>
-                <a:cs typeface="Consolas" panose="020B0609020204030204" pitchFamily="49" charset="0"/>
-              </a:rPr>
-              <a:t> </a:t>
-            </a:r>
-            <a:r>
-              <a:rPr lang="nl-NL" sz="2800" b="1" dirty="0" err="1" smtClean="0">
-                <a:solidFill>
-                  <a:srgbClr val="7F0055"/>
-                </a:solidFill>
-                <a:latin typeface="Consolas" panose="020B0609020204030204" pitchFamily="49" charset="0"/>
-                <a:cs typeface="Consolas" panose="020B0609020204030204" pitchFamily="49" charset="0"/>
-              </a:rPr>
-              <a:t>def</a:t>
-            </a:r>
-            <a:r>
-              <a:rPr lang="nl-NL" sz="2800" dirty="0" smtClean="0">
-                <a:solidFill>
-                  <a:srgbClr val="7F0055"/>
-                </a:solidFill>
-                <a:latin typeface="Consolas" panose="020B0609020204030204" pitchFamily="49" charset="0"/>
-                <a:cs typeface="Consolas" panose="020B0609020204030204" pitchFamily="49" charset="0"/>
-              </a:rPr>
-              <a:t> </a:t>
-            </a:r>
-            <a:r>
-              <a:rPr lang="nl-NL" sz="2800" dirty="0" err="1" smtClean="0">
-                <a:latin typeface="Consolas" panose="020B0609020204030204" pitchFamily="49" charset="0"/>
-                <a:cs typeface="Consolas" panose="020B0609020204030204" pitchFamily="49" charset="0"/>
-              </a:rPr>
-              <a:t>onError</a:t>
-            </a:r>
-            <a:r>
-              <a:rPr lang="nl-NL" sz="2800" dirty="0" smtClean="0">
-                <a:latin typeface="Consolas" panose="020B0609020204030204" pitchFamily="49" charset="0"/>
-                <a:cs typeface="Consolas" panose="020B0609020204030204" pitchFamily="49" charset="0"/>
-              </a:rPr>
-              <a:t>(e: </a:t>
-            </a:r>
-            <a:r>
-              <a:rPr lang="nl-NL" sz="2800" dirty="0" err="1" smtClean="0">
-                <a:latin typeface="Consolas" panose="020B0609020204030204" pitchFamily="49" charset="0"/>
-                <a:cs typeface="Consolas" panose="020B0609020204030204" pitchFamily="49" charset="0"/>
-              </a:rPr>
-              <a:t>Throwable</a:t>
-            </a:r>
-            <a:r>
-              <a:rPr lang="nl-NL" sz="2800" dirty="0" smtClean="0">
-                <a:latin typeface="Consolas" panose="020B0609020204030204" pitchFamily="49" charset="0"/>
-                <a:cs typeface="Consolas" panose="020B0609020204030204" pitchFamily="49" charset="0"/>
-              </a:rPr>
-              <a:t>) =</a:t>
-            </a:r>
-          </a:p>
-          <a:p>
-            <a:pPr marL="0" indent="0">
-              <a:buNone/>
-            </a:pPr>
-            <a:r>
-              <a:rPr lang="nl-NL" sz="2800" dirty="0">
-                <a:solidFill>
-                  <a:srgbClr val="5E5EFF"/>
-                </a:solidFill>
-                <a:latin typeface="Consolas" panose="020B0609020204030204" pitchFamily="49" charset="0"/>
-                <a:cs typeface="Consolas" panose="020B0609020204030204" pitchFamily="49" charset="0"/>
-              </a:rPr>
-              <a:t> </a:t>
-            </a:r>
-            <a:r>
-              <a:rPr lang="nl-NL" sz="2800" dirty="0" smtClean="0">
-                <a:solidFill>
-                  <a:srgbClr val="5E5EFF"/>
-                </a:solidFill>
-                <a:latin typeface="Consolas" panose="020B0609020204030204" pitchFamily="49" charset="0"/>
-                <a:cs typeface="Consolas" panose="020B0609020204030204" pitchFamily="49" charset="0"/>
-              </a:rPr>
-              <a:t>                             </a:t>
-            </a:r>
-            <a:r>
-              <a:rPr lang="nl-NL" sz="2800" dirty="0" err="1" smtClean="0">
-                <a:solidFill>
-                  <a:srgbClr val="5E5EFF"/>
-                </a:solidFill>
-                <a:latin typeface="Consolas" panose="020B0609020204030204" pitchFamily="49" charset="0"/>
-                <a:cs typeface="Consolas" panose="020B0609020204030204" pitchFamily="49" charset="0"/>
-              </a:rPr>
-              <a:t>subject</a:t>
-            </a:r>
-            <a:r>
-              <a:rPr lang="nl-NL" sz="2800" dirty="0" err="1" smtClean="0">
-                <a:latin typeface="Consolas" panose="020B0609020204030204" pitchFamily="49" charset="0"/>
-                <a:cs typeface="Consolas" panose="020B0609020204030204" pitchFamily="49" charset="0"/>
-              </a:rPr>
-              <a:t>.onError</a:t>
-            </a:r>
-            <a:r>
-              <a:rPr lang="nl-NL" sz="2800" dirty="0" smtClean="0">
-                <a:latin typeface="Consolas" panose="020B0609020204030204" pitchFamily="49" charset="0"/>
-                <a:cs typeface="Consolas" panose="020B0609020204030204" pitchFamily="49" charset="0"/>
-              </a:rPr>
-              <a:t>(e)</a:t>
-            </a:r>
-          </a:p>
-          <a:p>
-            <a:pPr marL="0" indent="0">
-              <a:buNone/>
-            </a:pPr>
-            <a:r>
-              <a:rPr lang="nl-NL" sz="2800" dirty="0" smtClean="0">
-                <a:latin typeface="Consolas" panose="020B0609020204030204" pitchFamily="49" charset="0"/>
-                <a:cs typeface="Consolas" panose="020B0609020204030204" pitchFamily="49" charset="0"/>
-              </a:rPr>
-              <a:t>  </a:t>
-            </a:r>
-            <a:r>
-              <a:rPr lang="nl-NL" sz="2800" b="1" dirty="0" err="1">
-                <a:solidFill>
-                  <a:srgbClr val="7F0055"/>
-                </a:solidFill>
-                <a:latin typeface="Consolas" panose="020B0609020204030204" pitchFamily="49" charset="0"/>
-                <a:cs typeface="Consolas" panose="020B0609020204030204" pitchFamily="49" charset="0"/>
-              </a:rPr>
-              <a:t>override</a:t>
-            </a:r>
-            <a:r>
-              <a:rPr lang="nl-NL" sz="2800" b="1" dirty="0">
-                <a:solidFill>
-                  <a:srgbClr val="7F0055"/>
-                </a:solidFill>
-                <a:latin typeface="Consolas" panose="020B0609020204030204" pitchFamily="49" charset="0"/>
-                <a:cs typeface="Consolas" panose="020B0609020204030204" pitchFamily="49" charset="0"/>
-              </a:rPr>
-              <a:t> </a:t>
-            </a:r>
-            <a:r>
-              <a:rPr lang="nl-NL" sz="2800" b="1" dirty="0" err="1" smtClean="0">
-                <a:solidFill>
-                  <a:srgbClr val="7F0055"/>
-                </a:solidFill>
-                <a:latin typeface="Consolas" panose="020B0609020204030204" pitchFamily="49" charset="0"/>
-                <a:cs typeface="Consolas" panose="020B0609020204030204" pitchFamily="49" charset="0"/>
-              </a:rPr>
-              <a:t>def</a:t>
-            </a:r>
-            <a:r>
-              <a:rPr lang="nl-NL" sz="2800" dirty="0" smtClean="0">
-                <a:solidFill>
-                  <a:srgbClr val="7F0055"/>
-                </a:solidFill>
-                <a:latin typeface="Consolas" panose="020B0609020204030204" pitchFamily="49" charset="0"/>
-                <a:cs typeface="Consolas" panose="020B0609020204030204" pitchFamily="49" charset="0"/>
-              </a:rPr>
-              <a:t> </a:t>
-            </a:r>
-            <a:r>
-              <a:rPr lang="nl-NL" sz="2800" dirty="0" err="1" smtClean="0">
-                <a:latin typeface="Consolas" panose="020B0609020204030204" pitchFamily="49" charset="0"/>
-                <a:cs typeface="Consolas" panose="020B0609020204030204" pitchFamily="49" charset="0"/>
-              </a:rPr>
-              <a:t>onCompleted</a:t>
-            </a:r>
-            <a:r>
-              <a:rPr lang="nl-NL" sz="2800" dirty="0">
-                <a:latin typeface="Consolas" panose="020B0609020204030204" pitchFamily="49" charset="0"/>
-                <a:cs typeface="Consolas" panose="020B0609020204030204" pitchFamily="49" charset="0"/>
-              </a:rPr>
-              <a:t> </a:t>
-            </a:r>
-            <a:r>
-              <a:rPr lang="nl-NL" sz="2800" dirty="0" smtClean="0">
-                <a:latin typeface="Consolas" panose="020B0609020204030204" pitchFamily="49" charset="0"/>
-                <a:cs typeface="Consolas" panose="020B0609020204030204" pitchFamily="49" charset="0"/>
-              </a:rPr>
-              <a:t>= </a:t>
-            </a:r>
-            <a:r>
-              <a:rPr lang="nl-NL" sz="2800" dirty="0" err="1" smtClean="0">
-                <a:solidFill>
-                  <a:srgbClr val="5E5EFF"/>
-                </a:solidFill>
-                <a:latin typeface="Consolas" panose="020B0609020204030204" pitchFamily="49" charset="0"/>
-                <a:cs typeface="Consolas" panose="020B0609020204030204" pitchFamily="49" charset="0"/>
-              </a:rPr>
-              <a:t>subject</a:t>
-            </a:r>
-            <a:r>
-              <a:rPr lang="nl-NL" sz="2800" dirty="0" err="1" smtClean="0">
-                <a:latin typeface="Consolas" panose="020B0609020204030204" pitchFamily="49" charset="0"/>
-                <a:cs typeface="Consolas" panose="020B0609020204030204" pitchFamily="49" charset="0"/>
-              </a:rPr>
-              <a:t>.onCompleted</a:t>
-            </a:r>
-            <a:endParaRPr lang="nl-NL" sz="2800" dirty="0">
-              <a:latin typeface="Consolas" panose="020B0609020204030204" pitchFamily="49" charset="0"/>
-              <a:cs typeface="Consolas" panose="020B0609020204030204" pitchFamily="49" charset="0"/>
-            </a:endParaRPr>
-          </a:p>
-          <a:p>
-            <a:pPr marL="0" indent="0">
-              <a:buNone/>
-            </a:pPr>
-            <a:r>
-              <a:rPr lang="nl-NL" sz="2800" dirty="0">
+              <a:rPr lang="nl-NL" sz="2800" dirty="0" smtClean="0">
                 <a:latin typeface="Consolas" panose="020B0609020204030204" pitchFamily="49" charset="0"/>
                 <a:cs typeface="Consolas" panose="020B0609020204030204" pitchFamily="49" charset="0"/>
               </a:rPr>
@@ -10527,6 +9928,2862 @@
             </a:r>
             <a:r>
               <a:rPr lang="nl-NL" dirty="0" smtClean="0"/>
+              <a:t> interface </a:t>
+            </a:r>
+            <a:endParaRPr lang="nl-NL" dirty="0"/>
+          </a:p>
+        </p:txBody>
+      </p:sp>
+    </p:spTree>
+    <p:extLst>
+      <p:ext uri="{BB962C8B-B14F-4D97-AF65-F5344CB8AC3E}">
+        <p14:creationId xmlns:p14="http://schemas.microsoft.com/office/powerpoint/2010/main" val="213656348"/>
+      </p:ext>
+    </p:extLst>
+  </p:cSld>
+  <p:clrMapOvr>
+    <a:masterClrMapping/>
+  </p:clrMapOvr>
+  <p:timing>
+    <p:tnLst>
+      <p:par>
+        <p:cTn id="1" dur="indefinite" restart="never" nodeType="tmRoot"/>
+      </p:par>
+    </p:tnLst>
+  </p:timing>
+</p:sld>
+</file>
+
+<file path=ppt/slides/slide23.xml><?xml version="1.0" encoding="utf-8"?>
+<p:sld xmlns:a="http://schemas.openxmlformats.org/drawingml/2006/main" xmlns:r="http://schemas.openxmlformats.org/officeDocument/2006/relationships" xmlns:p="http://schemas.openxmlformats.org/presentationml/2006/main">
+  <p:cSld>
+    <p:spTree>
+      <p:nvGrpSpPr>
+        <p:cNvPr id="1" name=""/>
+        <p:cNvGrpSpPr/>
+        <p:nvPr/>
+      </p:nvGrpSpPr>
+      <p:grpSpPr>
+        <a:xfrm>
+          <a:off x="0" y="0"/>
+          <a:ext cx="0" cy="0"/>
+          <a:chOff x="0" y="0"/>
+          <a:chExt cx="0" cy="0"/>
+        </a:xfrm>
+      </p:grpSpPr>
+      <p:sp>
+        <p:nvSpPr>
+          <p:cNvPr id="5" name="Tijdelijke aanduiding voor inhoud 4"/>
+          <p:cNvSpPr>
+            <a:spLocks noGrp="1"/>
+          </p:cNvSpPr>
+          <p:nvPr>
+            <p:ph idx="1"/>
+          </p:nvPr>
+        </p:nvSpPr>
+        <p:spPr>
+          <a:xfrm>
+            <a:off x="0" y="836712"/>
+            <a:ext cx="9144000" cy="6021288"/>
+          </a:xfrm>
+        </p:spPr>
+        <p:txBody>
+          <a:bodyPr>
+            <a:normAutofit/>
+          </a:bodyPr>
+          <a:lstStyle/>
+          <a:p>
+            <a:pPr marL="0" indent="0">
+              <a:buNone/>
+            </a:pPr>
+            <a:r>
+              <a:rPr lang="nl-NL" sz="2800" b="1" dirty="0" err="1" smtClean="0">
+                <a:solidFill>
+                  <a:srgbClr val="7F0055"/>
+                </a:solidFill>
+                <a:latin typeface="Consolas" panose="020B0609020204030204" pitchFamily="49" charset="0"/>
+                <a:cs typeface="Consolas" panose="020B0609020204030204" pitchFamily="49" charset="0"/>
+              </a:rPr>
+              <a:t>trait</a:t>
+            </a:r>
+            <a:r>
+              <a:rPr lang="nl-NL" sz="2800" dirty="0" smtClean="0">
+                <a:solidFill>
+                  <a:srgbClr val="7F0055"/>
+                </a:solidFill>
+                <a:latin typeface="Consolas" panose="020B0609020204030204" pitchFamily="49" charset="0"/>
+                <a:cs typeface="Consolas" panose="020B0609020204030204" pitchFamily="49" charset="0"/>
+              </a:rPr>
+              <a:t> </a:t>
+            </a:r>
+            <a:r>
+              <a:rPr lang="nl-NL" sz="2800" dirty="0">
+                <a:latin typeface="Consolas" panose="020B0609020204030204" pitchFamily="49" charset="0"/>
+                <a:cs typeface="Consolas" panose="020B0609020204030204" pitchFamily="49" charset="0"/>
+              </a:rPr>
+              <a:t>Component[I, O] {</a:t>
+            </a:r>
+          </a:p>
+          <a:p>
+            <a:pPr marL="0" indent="0">
+              <a:buNone/>
+            </a:pPr>
+            <a:r>
+              <a:rPr lang="nl-NL" sz="2800" dirty="0">
+                <a:latin typeface="Consolas" panose="020B0609020204030204" pitchFamily="49" charset="0"/>
+                <a:cs typeface="Consolas" panose="020B0609020204030204" pitchFamily="49" charset="0"/>
+              </a:rPr>
+              <a:t>  </a:t>
+            </a:r>
+            <a:r>
+              <a:rPr lang="nl-NL" sz="2800" b="1" dirty="0" err="1">
+                <a:solidFill>
+                  <a:srgbClr val="7F0055"/>
+                </a:solidFill>
+                <a:latin typeface="Consolas" panose="020B0609020204030204" pitchFamily="49" charset="0"/>
+                <a:cs typeface="Consolas" panose="020B0609020204030204" pitchFamily="49" charset="0"/>
+              </a:rPr>
+              <a:t>def</a:t>
+            </a:r>
+            <a:r>
+              <a:rPr lang="nl-NL" sz="2800" dirty="0">
+                <a:solidFill>
+                  <a:srgbClr val="7F0055"/>
+                </a:solidFill>
+                <a:latin typeface="Consolas" panose="020B0609020204030204" pitchFamily="49" charset="0"/>
+                <a:cs typeface="Consolas" panose="020B0609020204030204" pitchFamily="49" charset="0"/>
+              </a:rPr>
+              <a:t> </a:t>
+            </a:r>
+            <a:r>
+              <a:rPr lang="nl-NL" sz="2800" dirty="0" smtClean="0">
+                <a:latin typeface="Consolas" panose="020B0609020204030204" pitchFamily="49" charset="0"/>
+                <a:cs typeface="Consolas" panose="020B0609020204030204" pitchFamily="49" charset="0"/>
+              </a:rPr>
+              <a:t>in(i</a:t>
+            </a:r>
+            <a:r>
+              <a:rPr lang="nl-NL" sz="2800" dirty="0">
+                <a:latin typeface="Consolas" panose="020B0609020204030204" pitchFamily="49" charset="0"/>
+                <a:cs typeface="Consolas" panose="020B0609020204030204" pitchFamily="49" charset="0"/>
+              </a:rPr>
+              <a:t>: I</a:t>
+            </a:r>
+            <a:r>
+              <a:rPr lang="nl-NL" sz="2800" dirty="0" smtClean="0">
+                <a:latin typeface="Consolas" panose="020B0609020204030204" pitchFamily="49" charset="0"/>
+                <a:cs typeface="Consolas" panose="020B0609020204030204" pitchFamily="49" charset="0"/>
+              </a:rPr>
+              <a:t>): Unit</a:t>
+            </a:r>
+          </a:p>
+          <a:p>
+            <a:pPr marL="0" indent="0">
+              <a:buNone/>
+            </a:pPr>
+            <a:r>
+              <a:rPr lang="nl-NL" sz="2800" dirty="0">
+                <a:latin typeface="Consolas" panose="020B0609020204030204" pitchFamily="49" charset="0"/>
+                <a:cs typeface="Consolas" panose="020B0609020204030204" pitchFamily="49" charset="0"/>
+              </a:rPr>
+              <a:t> </a:t>
+            </a:r>
+            <a:r>
+              <a:rPr lang="nl-NL" sz="2800" dirty="0" smtClean="0">
+                <a:latin typeface="Consolas" panose="020B0609020204030204" pitchFamily="49" charset="0"/>
+                <a:cs typeface="Consolas" panose="020B0609020204030204" pitchFamily="49" charset="0"/>
+              </a:rPr>
+              <a:t> </a:t>
+            </a:r>
+            <a:r>
+              <a:rPr lang="nl-NL" sz="2800" b="1" dirty="0" err="1">
+                <a:solidFill>
+                  <a:srgbClr val="7F0055"/>
+                </a:solidFill>
+                <a:latin typeface="Consolas" panose="020B0609020204030204" pitchFamily="49" charset="0"/>
+                <a:cs typeface="Consolas" panose="020B0609020204030204" pitchFamily="49" charset="0"/>
+              </a:rPr>
+              <a:t>def</a:t>
+            </a:r>
+            <a:r>
+              <a:rPr lang="nl-NL" sz="2800" dirty="0">
+                <a:solidFill>
+                  <a:srgbClr val="7F0055"/>
+                </a:solidFill>
+                <a:latin typeface="Consolas" panose="020B0609020204030204" pitchFamily="49" charset="0"/>
+                <a:cs typeface="Consolas" panose="020B0609020204030204" pitchFamily="49" charset="0"/>
+              </a:rPr>
+              <a:t> </a:t>
+            </a:r>
+            <a:r>
+              <a:rPr lang="nl-NL" sz="2800" dirty="0" smtClean="0">
+                <a:latin typeface="Consolas" panose="020B0609020204030204" pitchFamily="49" charset="0"/>
+                <a:cs typeface="Consolas" panose="020B0609020204030204" pitchFamily="49" charset="0"/>
+              </a:rPr>
+              <a:t>out: </a:t>
+            </a:r>
+            <a:r>
+              <a:rPr lang="nl-NL" sz="2800" dirty="0" err="1" smtClean="0">
+                <a:latin typeface="Consolas" panose="020B0609020204030204" pitchFamily="49" charset="0"/>
+                <a:cs typeface="Consolas" panose="020B0609020204030204" pitchFamily="49" charset="0"/>
+              </a:rPr>
+              <a:t>Observable</a:t>
+            </a:r>
+            <a:r>
+              <a:rPr lang="nl-NL" sz="2800" dirty="0" smtClean="0">
+                <a:latin typeface="Consolas" panose="020B0609020204030204" pitchFamily="49" charset="0"/>
+                <a:cs typeface="Consolas" panose="020B0609020204030204" pitchFamily="49" charset="0"/>
+              </a:rPr>
+              <a:t>[O]</a:t>
+            </a:r>
+            <a:endParaRPr lang="nl-NL" sz="2800" dirty="0">
+              <a:latin typeface="Consolas" panose="020B0609020204030204" pitchFamily="49" charset="0"/>
+              <a:cs typeface="Consolas" panose="020B0609020204030204" pitchFamily="49" charset="0"/>
+            </a:endParaRPr>
+          </a:p>
+          <a:p>
+            <a:pPr marL="0" indent="0">
+              <a:buNone/>
+            </a:pPr>
+            <a:r>
+              <a:rPr lang="nl-NL" sz="2800" dirty="0" smtClean="0">
+                <a:latin typeface="Consolas" panose="020B0609020204030204" pitchFamily="49" charset="0"/>
+                <a:cs typeface="Consolas" panose="020B0609020204030204" pitchFamily="49" charset="0"/>
+              </a:rPr>
+              <a:t>}</a:t>
+            </a:r>
+            <a:r>
+              <a:rPr lang="nl-NL" sz="2800" dirty="0" smtClean="0">
+                <a:solidFill>
+                  <a:srgbClr val="3F7F5F"/>
+                </a:solidFill>
+                <a:latin typeface="Consolas" panose="020B0609020204030204" pitchFamily="49" charset="0"/>
+                <a:cs typeface="Consolas" panose="020B0609020204030204" pitchFamily="49" charset="0"/>
+              </a:rPr>
+              <a:t>    </a:t>
+            </a:r>
+            <a:r>
+              <a:rPr lang="nl-NL" sz="2800" dirty="0" smtClean="0">
+                <a:solidFill>
+                  <a:srgbClr val="3F7F5F"/>
+                </a:solidFill>
+                <a:latin typeface="Consolas" panose="020B0609020204030204" pitchFamily="49" charset="0"/>
+                <a:cs typeface="Consolas" panose="020B0609020204030204" pitchFamily="49" charset="0"/>
+              </a:rPr>
+              <a:t>// </a:t>
+            </a:r>
+            <a:r>
+              <a:rPr lang="nl-NL" sz="2800" dirty="0" err="1" smtClean="0">
+                <a:solidFill>
+                  <a:srgbClr val="3F7F5F"/>
+                </a:solidFill>
+                <a:latin typeface="Consolas" panose="020B0609020204030204" pitchFamily="49" charset="0"/>
+                <a:cs typeface="Consolas" panose="020B0609020204030204" pitchFamily="49" charset="0"/>
+              </a:rPr>
+              <a:t>actually</a:t>
+            </a:r>
+            <a:r>
+              <a:rPr lang="nl-NL" sz="2800" dirty="0" smtClean="0">
+                <a:solidFill>
+                  <a:srgbClr val="3F7F5F"/>
+                </a:solidFill>
+                <a:latin typeface="Consolas" panose="020B0609020204030204" pitchFamily="49" charset="0"/>
+                <a:cs typeface="Consolas" panose="020B0609020204030204" pitchFamily="49" charset="0"/>
+              </a:rPr>
+              <a:t> </a:t>
+            </a:r>
+            <a:r>
+              <a:rPr lang="nl-NL" sz="2800" dirty="0" err="1" smtClean="0">
+                <a:solidFill>
+                  <a:srgbClr val="3F7F5F"/>
+                </a:solidFill>
+                <a:latin typeface="Consolas" panose="020B0609020204030204" pitchFamily="49" charset="0"/>
+                <a:cs typeface="Consolas" panose="020B0609020204030204" pitchFamily="49" charset="0"/>
+              </a:rPr>
+              <a:t>it</a:t>
+            </a:r>
+            <a:r>
+              <a:rPr lang="nl-NL" sz="2800" dirty="0" smtClean="0">
+                <a:solidFill>
+                  <a:srgbClr val="3F7F5F"/>
+                </a:solidFill>
+                <a:latin typeface="Consolas" panose="020B0609020204030204" pitchFamily="49" charset="0"/>
+                <a:cs typeface="Consolas" panose="020B0609020204030204" pitchFamily="49" charset="0"/>
+              </a:rPr>
+              <a:t> has 3 in </a:t>
+            </a:r>
+            <a:r>
+              <a:rPr lang="nl-NL" sz="2800" dirty="0" err="1" smtClean="0">
+                <a:solidFill>
+                  <a:srgbClr val="3F7F5F"/>
+                </a:solidFill>
+                <a:latin typeface="Consolas" panose="020B0609020204030204" pitchFamily="49" charset="0"/>
+                <a:cs typeface="Consolas" panose="020B0609020204030204" pitchFamily="49" charset="0"/>
+              </a:rPr>
+              <a:t>methods</a:t>
+            </a:r>
+            <a:r>
+              <a:rPr lang="nl-NL" sz="2800" dirty="0" smtClean="0">
+                <a:solidFill>
+                  <a:srgbClr val="3F7F5F"/>
+                </a:solidFill>
+                <a:latin typeface="Consolas" panose="020B0609020204030204" pitchFamily="49" charset="0"/>
+                <a:cs typeface="Consolas" panose="020B0609020204030204" pitchFamily="49" charset="0"/>
+              </a:rPr>
+              <a:t>:</a:t>
+            </a:r>
+          </a:p>
+          <a:p>
+            <a:pPr marL="0" indent="0">
+              <a:buNone/>
+            </a:pPr>
+            <a:r>
+              <a:rPr lang="nl-NL" sz="2800" dirty="0" smtClean="0">
+                <a:solidFill>
+                  <a:srgbClr val="3F7F5F"/>
+                </a:solidFill>
+                <a:latin typeface="Consolas" panose="020B0609020204030204" pitchFamily="49" charset="0"/>
+                <a:cs typeface="Consolas" panose="020B0609020204030204" pitchFamily="49" charset="0"/>
+              </a:rPr>
+              <a:t>     // error </a:t>
+            </a:r>
+            <a:r>
+              <a:rPr lang="nl-NL" sz="2800" dirty="0" err="1" smtClean="0">
+                <a:solidFill>
+                  <a:srgbClr val="3F7F5F"/>
+                </a:solidFill>
+                <a:latin typeface="Consolas" panose="020B0609020204030204" pitchFamily="49" charset="0"/>
+                <a:cs typeface="Consolas" panose="020B0609020204030204" pitchFamily="49" charset="0"/>
+              </a:rPr>
+              <a:t>and</a:t>
+            </a:r>
+            <a:r>
+              <a:rPr lang="nl-NL" sz="2800" dirty="0" smtClean="0">
+                <a:solidFill>
+                  <a:srgbClr val="3F7F5F"/>
+                </a:solidFill>
+                <a:latin typeface="Consolas" panose="020B0609020204030204" pitchFamily="49" charset="0"/>
+                <a:cs typeface="Consolas" panose="020B0609020204030204" pitchFamily="49" charset="0"/>
+              </a:rPr>
+              <a:t> </a:t>
+            </a:r>
+            <a:r>
+              <a:rPr lang="nl-NL" sz="2800" dirty="0" err="1" smtClean="0">
+                <a:solidFill>
+                  <a:srgbClr val="3F7F5F"/>
+                </a:solidFill>
+                <a:latin typeface="Consolas" panose="020B0609020204030204" pitchFamily="49" charset="0"/>
+                <a:cs typeface="Consolas" panose="020B0609020204030204" pitchFamily="49" charset="0"/>
+              </a:rPr>
+              <a:t>completed</a:t>
+            </a:r>
+            <a:r>
+              <a:rPr lang="nl-NL" sz="2800" dirty="0" smtClean="0">
+                <a:solidFill>
+                  <a:srgbClr val="3F7F5F"/>
+                </a:solidFill>
+                <a:latin typeface="Consolas" panose="020B0609020204030204" pitchFamily="49" charset="0"/>
+                <a:cs typeface="Consolas" panose="020B0609020204030204" pitchFamily="49" charset="0"/>
+              </a:rPr>
+              <a:t> are </a:t>
+            </a:r>
+            <a:r>
+              <a:rPr lang="nl-NL" sz="2800" dirty="0" err="1" smtClean="0">
+                <a:solidFill>
+                  <a:srgbClr val="3F7F5F"/>
+                </a:solidFill>
+                <a:latin typeface="Consolas" panose="020B0609020204030204" pitchFamily="49" charset="0"/>
+                <a:cs typeface="Consolas" panose="020B0609020204030204" pitchFamily="49" charset="0"/>
+              </a:rPr>
+              <a:t>possible</a:t>
+            </a:r>
+            <a:r>
+              <a:rPr lang="nl-NL" sz="2800" dirty="0" smtClean="0">
+                <a:solidFill>
+                  <a:srgbClr val="3F7F5F"/>
+                </a:solidFill>
+                <a:latin typeface="Consolas" panose="020B0609020204030204" pitchFamily="49" charset="0"/>
+                <a:cs typeface="Consolas" panose="020B0609020204030204" pitchFamily="49" charset="0"/>
+              </a:rPr>
+              <a:t> </a:t>
+            </a:r>
+            <a:r>
+              <a:rPr lang="nl-NL" sz="2800" dirty="0" err="1" smtClean="0">
+                <a:solidFill>
+                  <a:srgbClr val="3F7F5F"/>
+                </a:solidFill>
+                <a:latin typeface="Consolas" panose="020B0609020204030204" pitchFamily="49" charset="0"/>
+                <a:cs typeface="Consolas" panose="020B0609020204030204" pitchFamily="49" charset="0"/>
+              </a:rPr>
+              <a:t>too</a:t>
+            </a:r>
+            <a:endParaRPr lang="nl-NL" sz="2800" b="1" dirty="0">
+              <a:solidFill>
+                <a:srgbClr val="3F7F5F"/>
+              </a:solidFill>
+              <a:latin typeface="Consolas" panose="020B0609020204030204" pitchFamily="49" charset="0"/>
+              <a:cs typeface="Consolas" panose="020B0609020204030204" pitchFamily="49" charset="0"/>
+            </a:endParaRPr>
+          </a:p>
+          <a:p>
+            <a:pPr marL="0" indent="0">
+              <a:buNone/>
+            </a:pPr>
+            <a:r>
+              <a:rPr lang="nl-NL" sz="2800" b="1" dirty="0" err="1">
+                <a:solidFill>
+                  <a:srgbClr val="7F0055"/>
+                </a:solidFill>
+                <a:latin typeface="Consolas" panose="020B0609020204030204" pitchFamily="49" charset="0"/>
+                <a:cs typeface="Consolas" panose="020B0609020204030204" pitchFamily="49" charset="0"/>
+              </a:rPr>
+              <a:t>trait</a:t>
+            </a:r>
+            <a:r>
+              <a:rPr lang="nl-NL" sz="2800" dirty="0">
+                <a:solidFill>
+                  <a:srgbClr val="7F0055"/>
+                </a:solidFill>
+                <a:latin typeface="Consolas" panose="020B0609020204030204" pitchFamily="49" charset="0"/>
+                <a:cs typeface="Consolas" panose="020B0609020204030204" pitchFamily="49" charset="0"/>
+              </a:rPr>
+              <a:t> </a:t>
+            </a:r>
+            <a:r>
+              <a:rPr lang="nl-NL" sz="2800" dirty="0">
+                <a:latin typeface="Consolas" panose="020B0609020204030204" pitchFamily="49" charset="0"/>
+                <a:cs typeface="Consolas" panose="020B0609020204030204" pitchFamily="49" charset="0"/>
+              </a:rPr>
+              <a:t>Component[I, O] {</a:t>
+            </a:r>
+          </a:p>
+          <a:p>
+            <a:pPr marL="0" indent="0">
+              <a:buNone/>
+            </a:pPr>
+            <a:r>
+              <a:rPr lang="nl-NL" sz="2800" dirty="0">
+                <a:latin typeface="Consolas" panose="020B0609020204030204" pitchFamily="49" charset="0"/>
+                <a:cs typeface="Consolas" panose="020B0609020204030204" pitchFamily="49" charset="0"/>
+              </a:rPr>
+              <a:t>  </a:t>
+            </a:r>
+            <a:r>
+              <a:rPr lang="nl-NL" sz="2800" b="1" dirty="0" err="1">
+                <a:solidFill>
+                  <a:srgbClr val="7F0055"/>
+                </a:solidFill>
+                <a:latin typeface="Consolas" panose="020B0609020204030204" pitchFamily="49" charset="0"/>
+                <a:cs typeface="Consolas" panose="020B0609020204030204" pitchFamily="49" charset="0"/>
+              </a:rPr>
+              <a:t>def</a:t>
+            </a:r>
+            <a:r>
+              <a:rPr lang="nl-NL" sz="2800" dirty="0">
+                <a:solidFill>
+                  <a:srgbClr val="7F0055"/>
+                </a:solidFill>
+                <a:latin typeface="Consolas" panose="020B0609020204030204" pitchFamily="49" charset="0"/>
+                <a:cs typeface="Consolas" panose="020B0609020204030204" pitchFamily="49" charset="0"/>
+              </a:rPr>
+              <a:t> </a:t>
+            </a:r>
+            <a:r>
+              <a:rPr lang="nl-NL" sz="2800" dirty="0" err="1" smtClean="0">
+                <a:latin typeface="Consolas" panose="020B0609020204030204" pitchFamily="49" charset="0"/>
+                <a:cs typeface="Consolas" panose="020B0609020204030204" pitchFamily="49" charset="0"/>
+              </a:rPr>
+              <a:t>inNext</a:t>
+            </a:r>
+            <a:r>
+              <a:rPr lang="nl-NL" sz="2800" dirty="0" smtClean="0">
+                <a:latin typeface="Consolas" panose="020B0609020204030204" pitchFamily="49" charset="0"/>
+                <a:cs typeface="Consolas" panose="020B0609020204030204" pitchFamily="49" charset="0"/>
+              </a:rPr>
+              <a:t>(i</a:t>
+            </a:r>
+            <a:r>
+              <a:rPr lang="nl-NL" sz="2800" dirty="0">
+                <a:latin typeface="Consolas" panose="020B0609020204030204" pitchFamily="49" charset="0"/>
+                <a:cs typeface="Consolas" panose="020B0609020204030204" pitchFamily="49" charset="0"/>
+              </a:rPr>
+              <a:t>: I): </a:t>
+            </a:r>
+            <a:r>
+              <a:rPr lang="nl-NL" sz="2800" dirty="0" smtClean="0">
+                <a:latin typeface="Consolas" panose="020B0609020204030204" pitchFamily="49" charset="0"/>
+                <a:cs typeface="Consolas" panose="020B0609020204030204" pitchFamily="49" charset="0"/>
+              </a:rPr>
+              <a:t>Unit</a:t>
+            </a:r>
+          </a:p>
+          <a:p>
+            <a:pPr marL="0" indent="0">
+              <a:buNone/>
+            </a:pPr>
+            <a:r>
+              <a:rPr lang="nl-NL" sz="2800" dirty="0" smtClean="0">
+                <a:latin typeface="Consolas" panose="020B0609020204030204" pitchFamily="49" charset="0"/>
+                <a:cs typeface="Consolas" panose="020B0609020204030204" pitchFamily="49" charset="0"/>
+              </a:rPr>
+              <a:t>  </a:t>
+            </a:r>
+            <a:r>
+              <a:rPr lang="nl-NL" sz="2800" b="1" dirty="0" err="1">
+                <a:solidFill>
+                  <a:srgbClr val="7F0055"/>
+                </a:solidFill>
+                <a:latin typeface="Consolas" panose="020B0609020204030204" pitchFamily="49" charset="0"/>
+                <a:cs typeface="Consolas" panose="020B0609020204030204" pitchFamily="49" charset="0"/>
+              </a:rPr>
+              <a:t>def</a:t>
+            </a:r>
+            <a:r>
+              <a:rPr lang="nl-NL" sz="2800" dirty="0">
+                <a:solidFill>
+                  <a:srgbClr val="7F0055"/>
+                </a:solidFill>
+                <a:latin typeface="Consolas" panose="020B0609020204030204" pitchFamily="49" charset="0"/>
+                <a:cs typeface="Consolas" panose="020B0609020204030204" pitchFamily="49" charset="0"/>
+              </a:rPr>
+              <a:t> </a:t>
+            </a:r>
+            <a:r>
+              <a:rPr lang="nl-NL" sz="2800" dirty="0" err="1" smtClean="0">
+                <a:latin typeface="Consolas" panose="020B0609020204030204" pitchFamily="49" charset="0"/>
+                <a:cs typeface="Consolas" panose="020B0609020204030204" pitchFamily="49" charset="0"/>
+              </a:rPr>
+              <a:t>inError</a:t>
+            </a:r>
+            <a:r>
+              <a:rPr lang="nl-NL" sz="2800" dirty="0" smtClean="0">
+                <a:latin typeface="Consolas" panose="020B0609020204030204" pitchFamily="49" charset="0"/>
+                <a:cs typeface="Consolas" panose="020B0609020204030204" pitchFamily="49" charset="0"/>
+              </a:rPr>
+              <a:t>(e: </a:t>
+            </a:r>
+            <a:r>
+              <a:rPr lang="nl-NL" sz="2800" dirty="0" err="1" smtClean="0">
+                <a:latin typeface="Consolas" panose="020B0609020204030204" pitchFamily="49" charset="0"/>
+                <a:cs typeface="Consolas" panose="020B0609020204030204" pitchFamily="49" charset="0"/>
+              </a:rPr>
+              <a:t>Throwable</a:t>
+            </a:r>
+            <a:r>
+              <a:rPr lang="nl-NL" sz="2800" dirty="0" smtClean="0">
+                <a:latin typeface="Consolas" panose="020B0609020204030204" pitchFamily="49" charset="0"/>
+                <a:cs typeface="Consolas" panose="020B0609020204030204" pitchFamily="49" charset="0"/>
+              </a:rPr>
+              <a:t>): Unit</a:t>
+            </a:r>
+          </a:p>
+          <a:p>
+            <a:pPr marL="0" indent="0">
+              <a:buNone/>
+            </a:pPr>
+            <a:r>
+              <a:rPr lang="nl-NL" sz="2800" dirty="0" smtClean="0">
+                <a:latin typeface="Consolas" panose="020B0609020204030204" pitchFamily="49" charset="0"/>
+                <a:cs typeface="Consolas" panose="020B0609020204030204" pitchFamily="49" charset="0"/>
+              </a:rPr>
+              <a:t>  </a:t>
+            </a:r>
+            <a:r>
+              <a:rPr lang="nl-NL" sz="2800" b="1" dirty="0" err="1">
+                <a:solidFill>
+                  <a:srgbClr val="7F0055"/>
+                </a:solidFill>
+                <a:latin typeface="Consolas" panose="020B0609020204030204" pitchFamily="49" charset="0"/>
+                <a:cs typeface="Consolas" panose="020B0609020204030204" pitchFamily="49" charset="0"/>
+              </a:rPr>
+              <a:t>def</a:t>
+            </a:r>
+            <a:r>
+              <a:rPr lang="nl-NL" sz="2800" dirty="0">
+                <a:solidFill>
+                  <a:srgbClr val="7F0055"/>
+                </a:solidFill>
+                <a:latin typeface="Consolas" panose="020B0609020204030204" pitchFamily="49" charset="0"/>
+                <a:cs typeface="Consolas" panose="020B0609020204030204" pitchFamily="49" charset="0"/>
+              </a:rPr>
+              <a:t> </a:t>
+            </a:r>
+            <a:r>
+              <a:rPr lang="nl-NL" sz="2800" dirty="0" err="1" smtClean="0">
+                <a:latin typeface="Consolas" panose="020B0609020204030204" pitchFamily="49" charset="0"/>
+                <a:cs typeface="Consolas" panose="020B0609020204030204" pitchFamily="49" charset="0"/>
+              </a:rPr>
+              <a:t>inCompleted</a:t>
+            </a:r>
+            <a:r>
+              <a:rPr lang="nl-NL" sz="2800" dirty="0" smtClean="0">
+                <a:latin typeface="Consolas" panose="020B0609020204030204" pitchFamily="49" charset="0"/>
+                <a:cs typeface="Consolas" panose="020B0609020204030204" pitchFamily="49" charset="0"/>
+              </a:rPr>
+              <a:t>(): Unit</a:t>
+            </a:r>
+            <a:endParaRPr lang="nl-NL" sz="2800" dirty="0">
+              <a:latin typeface="Consolas" panose="020B0609020204030204" pitchFamily="49" charset="0"/>
+              <a:cs typeface="Consolas" panose="020B0609020204030204" pitchFamily="49" charset="0"/>
+            </a:endParaRPr>
+          </a:p>
+          <a:p>
+            <a:pPr marL="0" indent="0">
+              <a:buNone/>
+            </a:pPr>
+            <a:r>
+              <a:rPr lang="nl-NL" sz="2800" dirty="0">
+                <a:latin typeface="Consolas" panose="020B0609020204030204" pitchFamily="49" charset="0"/>
+                <a:cs typeface="Consolas" panose="020B0609020204030204" pitchFamily="49" charset="0"/>
+              </a:rPr>
+              <a:t>  </a:t>
+            </a:r>
+            <a:r>
+              <a:rPr lang="nl-NL" sz="2800" b="1" dirty="0" err="1">
+                <a:solidFill>
+                  <a:srgbClr val="7F0055"/>
+                </a:solidFill>
+                <a:latin typeface="Consolas" panose="020B0609020204030204" pitchFamily="49" charset="0"/>
+                <a:cs typeface="Consolas" panose="020B0609020204030204" pitchFamily="49" charset="0"/>
+              </a:rPr>
+              <a:t>def</a:t>
+            </a:r>
+            <a:r>
+              <a:rPr lang="nl-NL" sz="2800" dirty="0">
+                <a:solidFill>
+                  <a:srgbClr val="7F0055"/>
+                </a:solidFill>
+                <a:latin typeface="Consolas" panose="020B0609020204030204" pitchFamily="49" charset="0"/>
+                <a:cs typeface="Consolas" panose="020B0609020204030204" pitchFamily="49" charset="0"/>
+              </a:rPr>
+              <a:t> </a:t>
+            </a:r>
+            <a:r>
+              <a:rPr lang="nl-NL" sz="2800" dirty="0">
+                <a:latin typeface="Consolas" panose="020B0609020204030204" pitchFamily="49" charset="0"/>
+                <a:cs typeface="Consolas" panose="020B0609020204030204" pitchFamily="49" charset="0"/>
+              </a:rPr>
+              <a:t>out: </a:t>
+            </a:r>
+            <a:r>
+              <a:rPr lang="nl-NL" sz="2800" dirty="0" err="1">
+                <a:latin typeface="Consolas" panose="020B0609020204030204" pitchFamily="49" charset="0"/>
+                <a:cs typeface="Consolas" panose="020B0609020204030204" pitchFamily="49" charset="0"/>
+              </a:rPr>
+              <a:t>Observable</a:t>
+            </a:r>
+            <a:r>
+              <a:rPr lang="nl-NL" sz="2800" dirty="0">
+                <a:latin typeface="Consolas" panose="020B0609020204030204" pitchFamily="49" charset="0"/>
+                <a:cs typeface="Consolas" panose="020B0609020204030204" pitchFamily="49" charset="0"/>
+              </a:rPr>
+              <a:t>[O]</a:t>
+            </a:r>
+          </a:p>
+          <a:p>
+            <a:pPr marL="0" indent="0">
+              <a:buNone/>
+            </a:pPr>
+            <a:r>
+              <a:rPr lang="nl-NL" sz="2800" dirty="0">
+                <a:latin typeface="Consolas" panose="020B0609020204030204" pitchFamily="49" charset="0"/>
+                <a:cs typeface="Consolas" panose="020B0609020204030204" pitchFamily="49" charset="0"/>
+              </a:rPr>
+              <a:t>}</a:t>
+            </a:r>
+            <a:endParaRPr lang="nl-NL" sz="2800" b="1" dirty="0">
+              <a:solidFill>
+                <a:srgbClr val="3F7F5F"/>
+              </a:solidFill>
+              <a:latin typeface="Consolas" panose="020B0609020204030204" pitchFamily="49" charset="0"/>
+              <a:cs typeface="Consolas" panose="020B0609020204030204" pitchFamily="49" charset="0"/>
+            </a:endParaRPr>
+          </a:p>
+        </p:txBody>
+      </p:sp>
+      <p:sp>
+        <p:nvSpPr>
+          <p:cNvPr id="7" name="Titel 3"/>
+          <p:cNvSpPr txBox="1">
+            <a:spLocks/>
+          </p:cNvSpPr>
+          <p:nvPr/>
+        </p:nvSpPr>
+        <p:spPr>
+          <a:xfrm>
+            <a:off x="457200" y="116632"/>
+            <a:ext cx="8229600" cy="720080"/>
+          </a:xfrm>
+          <a:prstGeom prst="rect">
+            <a:avLst/>
+          </a:prstGeom>
+        </p:spPr>
+        <p:txBody>
+          <a:bodyPr vert="horz" lIns="91440" tIns="45720" rIns="91440" bIns="45720" rtlCol="0" anchor="ctr">
+            <a:normAutofit lnSpcReduction="10000"/>
+          </a:bodyPr>
+          <a:lstStyle>
+            <a:lvl1pPr algn="ctr" defTabSz="914400" rtl="0" eaLnBrk="1" latinLnBrk="0" hangingPunct="1">
+              <a:spcBef>
+                <a:spcPct val="0"/>
+              </a:spcBef>
+              <a:buNone/>
+              <a:defRPr sz="4400" kern="1200">
+                <a:solidFill>
+                  <a:schemeClr val="tx1"/>
+                </a:solidFill>
+                <a:latin typeface="+mj-lt"/>
+                <a:ea typeface="+mj-ea"/>
+                <a:cs typeface="+mj-cs"/>
+              </a:defRPr>
+            </a:lvl1pPr>
+          </a:lstStyle>
+          <a:p>
+            <a:r>
+              <a:rPr lang="nl-NL" dirty="0" err="1" smtClean="0"/>
+              <a:t>Derivation</a:t>
+            </a:r>
+            <a:r>
+              <a:rPr lang="nl-NL" dirty="0" smtClean="0"/>
+              <a:t> </a:t>
+            </a:r>
+            <a:r>
+              <a:rPr lang="nl-NL" sz="3600" dirty="0" smtClean="0">
+                <a:latin typeface="Consolas" panose="020B0609020204030204" pitchFamily="49" charset="0"/>
+                <a:cs typeface="Consolas" panose="020B0609020204030204" pitchFamily="49" charset="0"/>
+              </a:rPr>
+              <a:t>Component</a:t>
+            </a:r>
+            <a:r>
+              <a:rPr lang="nl-NL" dirty="0" smtClean="0"/>
+              <a:t> interface </a:t>
+            </a:r>
+            <a:endParaRPr lang="nl-NL" dirty="0"/>
+          </a:p>
+        </p:txBody>
+      </p:sp>
+    </p:spTree>
+    <p:extLst>
+      <p:ext uri="{BB962C8B-B14F-4D97-AF65-F5344CB8AC3E}">
+        <p14:creationId xmlns:p14="http://schemas.microsoft.com/office/powerpoint/2010/main" val="2655640212"/>
+      </p:ext>
+    </p:extLst>
+  </p:cSld>
+  <p:clrMapOvr>
+    <a:masterClrMapping/>
+  </p:clrMapOvr>
+  <p:timing>
+    <p:tnLst>
+      <p:par>
+        <p:cTn id="1" dur="indefinite" restart="never" nodeType="tmRoot"/>
+      </p:par>
+    </p:tnLst>
+  </p:timing>
+</p:sld>
+</file>
+
+<file path=ppt/slides/slide24.xml><?xml version="1.0" encoding="utf-8"?>
+<p:sld xmlns:a="http://schemas.openxmlformats.org/drawingml/2006/main" xmlns:r="http://schemas.openxmlformats.org/officeDocument/2006/relationships" xmlns:p="http://schemas.openxmlformats.org/presentationml/2006/main">
+  <p:cSld>
+    <p:spTree>
+      <p:nvGrpSpPr>
+        <p:cNvPr id="1" name=""/>
+        <p:cNvGrpSpPr/>
+        <p:nvPr/>
+      </p:nvGrpSpPr>
+      <p:grpSpPr>
+        <a:xfrm>
+          <a:off x="0" y="0"/>
+          <a:ext cx="0" cy="0"/>
+          <a:chOff x="0" y="0"/>
+          <a:chExt cx="0" cy="0"/>
+        </a:xfrm>
+      </p:grpSpPr>
+      <p:sp>
+        <p:nvSpPr>
+          <p:cNvPr id="5" name="Tijdelijke aanduiding voor inhoud 4"/>
+          <p:cNvSpPr>
+            <a:spLocks noGrp="1"/>
+          </p:cNvSpPr>
+          <p:nvPr>
+            <p:ph idx="1"/>
+          </p:nvPr>
+        </p:nvSpPr>
+        <p:spPr>
+          <a:xfrm>
+            <a:off x="0" y="836712"/>
+            <a:ext cx="9144000" cy="6021288"/>
+          </a:xfrm>
+        </p:spPr>
+        <p:txBody>
+          <a:bodyPr>
+            <a:normAutofit/>
+          </a:bodyPr>
+          <a:lstStyle/>
+          <a:p>
+            <a:pPr marL="0" indent="0">
+              <a:buNone/>
+            </a:pPr>
+            <a:r>
+              <a:rPr lang="nl-NL" sz="2800" b="1" dirty="0" err="1" smtClean="0">
+                <a:solidFill>
+                  <a:srgbClr val="7F0055"/>
+                </a:solidFill>
+                <a:latin typeface="Consolas" panose="020B0609020204030204" pitchFamily="49" charset="0"/>
+                <a:cs typeface="Consolas" panose="020B0609020204030204" pitchFamily="49" charset="0"/>
+              </a:rPr>
+              <a:t>trait</a:t>
+            </a:r>
+            <a:r>
+              <a:rPr lang="nl-NL" sz="2800" dirty="0" smtClean="0">
+                <a:solidFill>
+                  <a:srgbClr val="7F0055"/>
+                </a:solidFill>
+                <a:latin typeface="Consolas" panose="020B0609020204030204" pitchFamily="49" charset="0"/>
+                <a:cs typeface="Consolas" panose="020B0609020204030204" pitchFamily="49" charset="0"/>
+              </a:rPr>
+              <a:t> </a:t>
+            </a:r>
+            <a:r>
+              <a:rPr lang="nl-NL" sz="2800" dirty="0">
+                <a:latin typeface="Consolas" panose="020B0609020204030204" pitchFamily="49" charset="0"/>
+                <a:cs typeface="Consolas" panose="020B0609020204030204" pitchFamily="49" charset="0"/>
+              </a:rPr>
+              <a:t>Component[I, O] {</a:t>
+            </a:r>
+          </a:p>
+          <a:p>
+            <a:pPr marL="0" indent="0">
+              <a:buNone/>
+            </a:pPr>
+            <a:r>
+              <a:rPr lang="nl-NL" sz="2800" dirty="0">
+                <a:latin typeface="Consolas" panose="020B0609020204030204" pitchFamily="49" charset="0"/>
+                <a:cs typeface="Consolas" panose="020B0609020204030204" pitchFamily="49" charset="0"/>
+              </a:rPr>
+              <a:t>  </a:t>
+            </a:r>
+            <a:r>
+              <a:rPr lang="nl-NL" sz="2800" b="1" dirty="0" err="1">
+                <a:solidFill>
+                  <a:srgbClr val="7F0055"/>
+                </a:solidFill>
+                <a:latin typeface="Consolas" panose="020B0609020204030204" pitchFamily="49" charset="0"/>
+                <a:cs typeface="Consolas" panose="020B0609020204030204" pitchFamily="49" charset="0"/>
+              </a:rPr>
+              <a:t>def</a:t>
+            </a:r>
+            <a:r>
+              <a:rPr lang="nl-NL" sz="2800" dirty="0">
+                <a:solidFill>
+                  <a:srgbClr val="7F0055"/>
+                </a:solidFill>
+                <a:latin typeface="Consolas" panose="020B0609020204030204" pitchFamily="49" charset="0"/>
+                <a:cs typeface="Consolas" panose="020B0609020204030204" pitchFamily="49" charset="0"/>
+              </a:rPr>
+              <a:t> </a:t>
+            </a:r>
+            <a:r>
+              <a:rPr lang="nl-NL" sz="2800" dirty="0" err="1" smtClean="0">
+                <a:latin typeface="Consolas" panose="020B0609020204030204" pitchFamily="49" charset="0"/>
+                <a:cs typeface="Consolas" panose="020B0609020204030204" pitchFamily="49" charset="0"/>
+              </a:rPr>
+              <a:t>inNext</a:t>
+            </a:r>
+            <a:r>
+              <a:rPr lang="nl-NL" sz="2800" dirty="0" smtClean="0">
+                <a:latin typeface="Consolas" panose="020B0609020204030204" pitchFamily="49" charset="0"/>
+                <a:cs typeface="Consolas" panose="020B0609020204030204" pitchFamily="49" charset="0"/>
+              </a:rPr>
+              <a:t>(i</a:t>
+            </a:r>
+            <a:r>
+              <a:rPr lang="nl-NL" sz="2800" dirty="0">
+                <a:latin typeface="Consolas" panose="020B0609020204030204" pitchFamily="49" charset="0"/>
+                <a:cs typeface="Consolas" panose="020B0609020204030204" pitchFamily="49" charset="0"/>
+              </a:rPr>
+              <a:t>: I): </a:t>
+            </a:r>
+            <a:r>
+              <a:rPr lang="nl-NL" sz="2800" dirty="0" smtClean="0">
+                <a:latin typeface="Consolas" panose="020B0609020204030204" pitchFamily="49" charset="0"/>
+                <a:cs typeface="Consolas" panose="020B0609020204030204" pitchFamily="49" charset="0"/>
+              </a:rPr>
+              <a:t>Unit</a:t>
+            </a:r>
+          </a:p>
+          <a:p>
+            <a:pPr marL="0" indent="0">
+              <a:buNone/>
+            </a:pPr>
+            <a:r>
+              <a:rPr lang="nl-NL" sz="2800" dirty="0" smtClean="0">
+                <a:latin typeface="Consolas" panose="020B0609020204030204" pitchFamily="49" charset="0"/>
+                <a:cs typeface="Consolas" panose="020B0609020204030204" pitchFamily="49" charset="0"/>
+              </a:rPr>
+              <a:t>  </a:t>
+            </a:r>
+            <a:r>
+              <a:rPr lang="nl-NL" sz="2800" b="1" dirty="0" err="1">
+                <a:solidFill>
+                  <a:srgbClr val="7F0055"/>
+                </a:solidFill>
+                <a:latin typeface="Consolas" panose="020B0609020204030204" pitchFamily="49" charset="0"/>
+                <a:cs typeface="Consolas" panose="020B0609020204030204" pitchFamily="49" charset="0"/>
+              </a:rPr>
+              <a:t>def</a:t>
+            </a:r>
+            <a:r>
+              <a:rPr lang="nl-NL" sz="2800" dirty="0">
+                <a:solidFill>
+                  <a:srgbClr val="7F0055"/>
+                </a:solidFill>
+                <a:latin typeface="Consolas" panose="020B0609020204030204" pitchFamily="49" charset="0"/>
+                <a:cs typeface="Consolas" panose="020B0609020204030204" pitchFamily="49" charset="0"/>
+              </a:rPr>
+              <a:t> </a:t>
+            </a:r>
+            <a:r>
+              <a:rPr lang="nl-NL" sz="2800" dirty="0" err="1" smtClean="0">
+                <a:latin typeface="Consolas" panose="020B0609020204030204" pitchFamily="49" charset="0"/>
+                <a:cs typeface="Consolas" panose="020B0609020204030204" pitchFamily="49" charset="0"/>
+              </a:rPr>
+              <a:t>inError</a:t>
+            </a:r>
+            <a:r>
+              <a:rPr lang="nl-NL" sz="2800" dirty="0" smtClean="0">
+                <a:latin typeface="Consolas" panose="020B0609020204030204" pitchFamily="49" charset="0"/>
+                <a:cs typeface="Consolas" panose="020B0609020204030204" pitchFamily="49" charset="0"/>
+              </a:rPr>
+              <a:t>(e: </a:t>
+            </a:r>
+            <a:r>
+              <a:rPr lang="nl-NL" sz="2800" dirty="0" err="1" smtClean="0">
+                <a:latin typeface="Consolas" panose="020B0609020204030204" pitchFamily="49" charset="0"/>
+                <a:cs typeface="Consolas" panose="020B0609020204030204" pitchFamily="49" charset="0"/>
+              </a:rPr>
+              <a:t>Throwable</a:t>
+            </a:r>
+            <a:r>
+              <a:rPr lang="nl-NL" sz="2800" dirty="0" smtClean="0">
+                <a:latin typeface="Consolas" panose="020B0609020204030204" pitchFamily="49" charset="0"/>
+                <a:cs typeface="Consolas" panose="020B0609020204030204" pitchFamily="49" charset="0"/>
+              </a:rPr>
+              <a:t>): Unit</a:t>
+            </a:r>
+          </a:p>
+          <a:p>
+            <a:pPr marL="0" indent="0">
+              <a:buNone/>
+            </a:pPr>
+            <a:r>
+              <a:rPr lang="nl-NL" sz="2800" dirty="0" smtClean="0">
+                <a:latin typeface="Consolas" panose="020B0609020204030204" pitchFamily="49" charset="0"/>
+                <a:cs typeface="Consolas" panose="020B0609020204030204" pitchFamily="49" charset="0"/>
+              </a:rPr>
+              <a:t>  </a:t>
+            </a:r>
+            <a:r>
+              <a:rPr lang="nl-NL" sz="2800" b="1" dirty="0" err="1">
+                <a:solidFill>
+                  <a:srgbClr val="7F0055"/>
+                </a:solidFill>
+                <a:latin typeface="Consolas" panose="020B0609020204030204" pitchFamily="49" charset="0"/>
+                <a:cs typeface="Consolas" panose="020B0609020204030204" pitchFamily="49" charset="0"/>
+              </a:rPr>
+              <a:t>def</a:t>
+            </a:r>
+            <a:r>
+              <a:rPr lang="nl-NL" sz="2800" dirty="0">
+                <a:solidFill>
+                  <a:srgbClr val="7F0055"/>
+                </a:solidFill>
+                <a:latin typeface="Consolas" panose="020B0609020204030204" pitchFamily="49" charset="0"/>
+                <a:cs typeface="Consolas" panose="020B0609020204030204" pitchFamily="49" charset="0"/>
+              </a:rPr>
+              <a:t> </a:t>
+            </a:r>
+            <a:r>
+              <a:rPr lang="nl-NL" sz="2800" dirty="0" err="1" smtClean="0">
+                <a:latin typeface="Consolas" panose="020B0609020204030204" pitchFamily="49" charset="0"/>
+                <a:cs typeface="Consolas" panose="020B0609020204030204" pitchFamily="49" charset="0"/>
+              </a:rPr>
+              <a:t>inCompleted</a:t>
+            </a:r>
+            <a:r>
+              <a:rPr lang="nl-NL" sz="2800" dirty="0" smtClean="0">
+                <a:latin typeface="Consolas" panose="020B0609020204030204" pitchFamily="49" charset="0"/>
+                <a:cs typeface="Consolas" panose="020B0609020204030204" pitchFamily="49" charset="0"/>
+              </a:rPr>
+              <a:t>(): </a:t>
+            </a:r>
+            <a:r>
+              <a:rPr lang="nl-NL" sz="2800" dirty="0">
+                <a:latin typeface="Consolas" panose="020B0609020204030204" pitchFamily="49" charset="0"/>
+                <a:cs typeface="Consolas" panose="020B0609020204030204" pitchFamily="49" charset="0"/>
+              </a:rPr>
+              <a:t>Unit</a:t>
+            </a:r>
+          </a:p>
+          <a:p>
+            <a:pPr marL="0" indent="0">
+              <a:buNone/>
+            </a:pPr>
+            <a:r>
+              <a:rPr lang="nl-NL" sz="2800" dirty="0">
+                <a:latin typeface="Consolas" panose="020B0609020204030204" pitchFamily="49" charset="0"/>
+                <a:cs typeface="Consolas" panose="020B0609020204030204" pitchFamily="49" charset="0"/>
+              </a:rPr>
+              <a:t>  </a:t>
+            </a:r>
+            <a:r>
+              <a:rPr lang="nl-NL" sz="2800" b="1" dirty="0" err="1">
+                <a:solidFill>
+                  <a:srgbClr val="7F0055"/>
+                </a:solidFill>
+                <a:latin typeface="Consolas" panose="020B0609020204030204" pitchFamily="49" charset="0"/>
+                <a:cs typeface="Consolas" panose="020B0609020204030204" pitchFamily="49" charset="0"/>
+              </a:rPr>
+              <a:t>def</a:t>
+            </a:r>
+            <a:r>
+              <a:rPr lang="nl-NL" sz="2800" dirty="0">
+                <a:solidFill>
+                  <a:srgbClr val="7F0055"/>
+                </a:solidFill>
+                <a:latin typeface="Consolas" panose="020B0609020204030204" pitchFamily="49" charset="0"/>
+                <a:cs typeface="Consolas" panose="020B0609020204030204" pitchFamily="49" charset="0"/>
+              </a:rPr>
+              <a:t> </a:t>
+            </a:r>
+            <a:r>
+              <a:rPr lang="nl-NL" sz="2800" dirty="0">
+                <a:latin typeface="Consolas" panose="020B0609020204030204" pitchFamily="49" charset="0"/>
+                <a:cs typeface="Consolas" panose="020B0609020204030204" pitchFamily="49" charset="0"/>
+              </a:rPr>
+              <a:t>out: </a:t>
+            </a:r>
+            <a:r>
+              <a:rPr lang="nl-NL" sz="2800" dirty="0" err="1">
+                <a:latin typeface="Consolas" panose="020B0609020204030204" pitchFamily="49" charset="0"/>
+                <a:cs typeface="Consolas" panose="020B0609020204030204" pitchFamily="49" charset="0"/>
+              </a:rPr>
+              <a:t>Observable</a:t>
+            </a:r>
+            <a:r>
+              <a:rPr lang="nl-NL" sz="2800" dirty="0">
+                <a:latin typeface="Consolas" panose="020B0609020204030204" pitchFamily="49" charset="0"/>
+                <a:cs typeface="Consolas" panose="020B0609020204030204" pitchFamily="49" charset="0"/>
+              </a:rPr>
+              <a:t>[O]</a:t>
+            </a:r>
+          </a:p>
+          <a:p>
+            <a:pPr marL="0" indent="0">
+              <a:buNone/>
+            </a:pPr>
+            <a:r>
+              <a:rPr lang="nl-NL" sz="2800" dirty="0" smtClean="0">
+                <a:latin typeface="Consolas" panose="020B0609020204030204" pitchFamily="49" charset="0"/>
+                <a:cs typeface="Consolas" panose="020B0609020204030204" pitchFamily="49" charset="0"/>
+              </a:rPr>
+              <a:t>}</a:t>
+            </a:r>
+            <a:endParaRPr lang="nl-NL" sz="2800" dirty="0">
+              <a:solidFill>
+                <a:srgbClr val="3F7F5F"/>
+              </a:solidFill>
+              <a:latin typeface="Consolas" panose="020B0609020204030204" pitchFamily="49" charset="0"/>
+              <a:cs typeface="Consolas" panose="020B0609020204030204" pitchFamily="49" charset="0"/>
+            </a:endParaRPr>
+          </a:p>
+        </p:txBody>
+      </p:sp>
+      <p:sp>
+        <p:nvSpPr>
+          <p:cNvPr id="7" name="Titel 3"/>
+          <p:cNvSpPr txBox="1">
+            <a:spLocks/>
+          </p:cNvSpPr>
+          <p:nvPr/>
+        </p:nvSpPr>
+        <p:spPr>
+          <a:xfrm>
+            <a:off x="457200" y="116632"/>
+            <a:ext cx="8229600" cy="720080"/>
+          </a:xfrm>
+          <a:prstGeom prst="rect">
+            <a:avLst/>
+          </a:prstGeom>
+        </p:spPr>
+        <p:txBody>
+          <a:bodyPr vert="horz" lIns="91440" tIns="45720" rIns="91440" bIns="45720" rtlCol="0" anchor="ctr">
+            <a:normAutofit lnSpcReduction="10000"/>
+          </a:bodyPr>
+          <a:lstStyle>
+            <a:lvl1pPr algn="ctr" defTabSz="914400" rtl="0" eaLnBrk="1" latinLnBrk="0" hangingPunct="1">
+              <a:spcBef>
+                <a:spcPct val="0"/>
+              </a:spcBef>
+              <a:buNone/>
+              <a:defRPr sz="4400" kern="1200">
+                <a:solidFill>
+                  <a:schemeClr val="tx1"/>
+                </a:solidFill>
+                <a:latin typeface="+mj-lt"/>
+                <a:ea typeface="+mj-ea"/>
+                <a:cs typeface="+mj-cs"/>
+              </a:defRPr>
+            </a:lvl1pPr>
+          </a:lstStyle>
+          <a:p>
+            <a:r>
+              <a:rPr lang="nl-NL" dirty="0" err="1" smtClean="0"/>
+              <a:t>Derivation</a:t>
+            </a:r>
+            <a:r>
+              <a:rPr lang="nl-NL" dirty="0" smtClean="0"/>
+              <a:t> </a:t>
+            </a:r>
+            <a:r>
+              <a:rPr lang="nl-NL" sz="3600" dirty="0" smtClean="0">
+                <a:latin typeface="Consolas" panose="020B0609020204030204" pitchFamily="49" charset="0"/>
+                <a:cs typeface="Consolas" panose="020B0609020204030204" pitchFamily="49" charset="0"/>
+              </a:rPr>
+              <a:t>Component</a:t>
+            </a:r>
+            <a:r>
+              <a:rPr lang="nl-NL" dirty="0" smtClean="0"/>
+              <a:t> interface </a:t>
+            </a:r>
+            <a:endParaRPr lang="nl-NL" dirty="0"/>
+          </a:p>
+        </p:txBody>
+      </p:sp>
+    </p:spTree>
+    <p:extLst>
+      <p:ext uri="{BB962C8B-B14F-4D97-AF65-F5344CB8AC3E}">
+        <p14:creationId xmlns:p14="http://schemas.microsoft.com/office/powerpoint/2010/main" val="614971355"/>
+      </p:ext>
+    </p:extLst>
+  </p:cSld>
+  <p:clrMapOvr>
+    <a:masterClrMapping/>
+  </p:clrMapOvr>
+  <p:timing>
+    <p:tnLst>
+      <p:par>
+        <p:cTn id="1" dur="indefinite" restart="never" nodeType="tmRoot"/>
+      </p:par>
+    </p:tnLst>
+  </p:timing>
+</p:sld>
+</file>
+
+<file path=ppt/slides/slide25.xml><?xml version="1.0" encoding="utf-8"?>
+<p:sld xmlns:a="http://schemas.openxmlformats.org/drawingml/2006/main" xmlns:r="http://schemas.openxmlformats.org/officeDocument/2006/relationships" xmlns:p="http://schemas.openxmlformats.org/presentationml/2006/main">
+  <p:cSld>
+    <p:spTree>
+      <p:nvGrpSpPr>
+        <p:cNvPr id="1" name=""/>
+        <p:cNvGrpSpPr/>
+        <p:nvPr/>
+      </p:nvGrpSpPr>
+      <p:grpSpPr>
+        <a:xfrm>
+          <a:off x="0" y="0"/>
+          <a:ext cx="0" cy="0"/>
+          <a:chOff x="0" y="0"/>
+          <a:chExt cx="0" cy="0"/>
+        </a:xfrm>
+      </p:grpSpPr>
+      <p:sp>
+        <p:nvSpPr>
+          <p:cNvPr id="5" name="Tijdelijke aanduiding voor inhoud 4"/>
+          <p:cNvSpPr>
+            <a:spLocks noGrp="1"/>
+          </p:cNvSpPr>
+          <p:nvPr>
+            <p:ph idx="1"/>
+          </p:nvPr>
+        </p:nvSpPr>
+        <p:spPr>
+          <a:xfrm>
+            <a:off x="0" y="836712"/>
+            <a:ext cx="9144000" cy="6021288"/>
+          </a:xfrm>
+        </p:spPr>
+        <p:txBody>
+          <a:bodyPr>
+            <a:normAutofit/>
+          </a:bodyPr>
+          <a:lstStyle/>
+          <a:p>
+            <a:pPr marL="0" indent="0">
+              <a:buNone/>
+            </a:pPr>
+            <a:r>
+              <a:rPr lang="nl-NL" sz="2800" b="1" dirty="0" err="1" smtClean="0">
+                <a:solidFill>
+                  <a:srgbClr val="7F0055"/>
+                </a:solidFill>
+                <a:latin typeface="Consolas" panose="020B0609020204030204" pitchFamily="49" charset="0"/>
+                <a:cs typeface="Consolas" panose="020B0609020204030204" pitchFamily="49" charset="0"/>
+              </a:rPr>
+              <a:t>trait</a:t>
+            </a:r>
+            <a:r>
+              <a:rPr lang="nl-NL" sz="2800" dirty="0" smtClean="0">
+                <a:solidFill>
+                  <a:srgbClr val="7F0055"/>
+                </a:solidFill>
+                <a:latin typeface="Consolas" panose="020B0609020204030204" pitchFamily="49" charset="0"/>
+                <a:cs typeface="Consolas" panose="020B0609020204030204" pitchFamily="49" charset="0"/>
+              </a:rPr>
+              <a:t> </a:t>
+            </a:r>
+            <a:r>
+              <a:rPr lang="nl-NL" sz="2800" dirty="0">
+                <a:latin typeface="Consolas" panose="020B0609020204030204" pitchFamily="49" charset="0"/>
+                <a:cs typeface="Consolas" panose="020B0609020204030204" pitchFamily="49" charset="0"/>
+              </a:rPr>
+              <a:t>Component[I, O] {</a:t>
+            </a:r>
+          </a:p>
+          <a:p>
+            <a:pPr marL="0" indent="0">
+              <a:buNone/>
+            </a:pPr>
+            <a:r>
+              <a:rPr lang="nl-NL" sz="2800" dirty="0">
+                <a:latin typeface="Consolas" panose="020B0609020204030204" pitchFamily="49" charset="0"/>
+                <a:cs typeface="Consolas" panose="020B0609020204030204" pitchFamily="49" charset="0"/>
+              </a:rPr>
+              <a:t>  </a:t>
+            </a:r>
+            <a:r>
+              <a:rPr lang="nl-NL" sz="2800" b="1" dirty="0" err="1">
+                <a:solidFill>
+                  <a:srgbClr val="7F0055"/>
+                </a:solidFill>
+                <a:latin typeface="Consolas" panose="020B0609020204030204" pitchFamily="49" charset="0"/>
+                <a:cs typeface="Consolas" panose="020B0609020204030204" pitchFamily="49" charset="0"/>
+              </a:rPr>
+              <a:t>def</a:t>
+            </a:r>
+            <a:r>
+              <a:rPr lang="nl-NL" sz="2800" dirty="0">
+                <a:solidFill>
+                  <a:srgbClr val="7F0055"/>
+                </a:solidFill>
+                <a:latin typeface="Consolas" panose="020B0609020204030204" pitchFamily="49" charset="0"/>
+                <a:cs typeface="Consolas" panose="020B0609020204030204" pitchFamily="49" charset="0"/>
+              </a:rPr>
+              <a:t> </a:t>
+            </a:r>
+            <a:r>
+              <a:rPr lang="nl-NL" sz="2800" dirty="0" err="1" smtClean="0">
+                <a:latin typeface="Consolas" panose="020B0609020204030204" pitchFamily="49" charset="0"/>
+                <a:cs typeface="Consolas" panose="020B0609020204030204" pitchFamily="49" charset="0"/>
+              </a:rPr>
+              <a:t>inNext</a:t>
+            </a:r>
+            <a:r>
+              <a:rPr lang="nl-NL" sz="2800" dirty="0" smtClean="0">
+                <a:latin typeface="Consolas" panose="020B0609020204030204" pitchFamily="49" charset="0"/>
+                <a:cs typeface="Consolas" panose="020B0609020204030204" pitchFamily="49" charset="0"/>
+              </a:rPr>
+              <a:t>(i</a:t>
+            </a:r>
+            <a:r>
+              <a:rPr lang="nl-NL" sz="2800" dirty="0">
+                <a:latin typeface="Consolas" panose="020B0609020204030204" pitchFamily="49" charset="0"/>
+                <a:cs typeface="Consolas" panose="020B0609020204030204" pitchFamily="49" charset="0"/>
+              </a:rPr>
+              <a:t>: I): </a:t>
+            </a:r>
+            <a:r>
+              <a:rPr lang="nl-NL" sz="2800" dirty="0" smtClean="0">
+                <a:latin typeface="Consolas" panose="020B0609020204030204" pitchFamily="49" charset="0"/>
+                <a:cs typeface="Consolas" panose="020B0609020204030204" pitchFamily="49" charset="0"/>
+              </a:rPr>
+              <a:t>Unit</a:t>
+            </a:r>
+          </a:p>
+          <a:p>
+            <a:pPr marL="0" indent="0">
+              <a:buNone/>
+            </a:pPr>
+            <a:r>
+              <a:rPr lang="nl-NL" sz="2800" dirty="0" smtClean="0">
+                <a:latin typeface="Consolas" panose="020B0609020204030204" pitchFamily="49" charset="0"/>
+                <a:cs typeface="Consolas" panose="020B0609020204030204" pitchFamily="49" charset="0"/>
+              </a:rPr>
+              <a:t>  </a:t>
+            </a:r>
+            <a:r>
+              <a:rPr lang="nl-NL" sz="2800" b="1" dirty="0" err="1">
+                <a:solidFill>
+                  <a:srgbClr val="7F0055"/>
+                </a:solidFill>
+                <a:latin typeface="Consolas" panose="020B0609020204030204" pitchFamily="49" charset="0"/>
+                <a:cs typeface="Consolas" panose="020B0609020204030204" pitchFamily="49" charset="0"/>
+              </a:rPr>
+              <a:t>def</a:t>
+            </a:r>
+            <a:r>
+              <a:rPr lang="nl-NL" sz="2800" dirty="0">
+                <a:solidFill>
+                  <a:srgbClr val="7F0055"/>
+                </a:solidFill>
+                <a:latin typeface="Consolas" panose="020B0609020204030204" pitchFamily="49" charset="0"/>
+                <a:cs typeface="Consolas" panose="020B0609020204030204" pitchFamily="49" charset="0"/>
+              </a:rPr>
+              <a:t> </a:t>
+            </a:r>
+            <a:r>
+              <a:rPr lang="nl-NL" sz="2800" dirty="0" err="1" smtClean="0">
+                <a:latin typeface="Consolas" panose="020B0609020204030204" pitchFamily="49" charset="0"/>
+                <a:cs typeface="Consolas" panose="020B0609020204030204" pitchFamily="49" charset="0"/>
+              </a:rPr>
+              <a:t>inError</a:t>
+            </a:r>
+            <a:r>
+              <a:rPr lang="nl-NL" sz="2800" dirty="0" smtClean="0">
+                <a:latin typeface="Consolas" panose="020B0609020204030204" pitchFamily="49" charset="0"/>
+                <a:cs typeface="Consolas" panose="020B0609020204030204" pitchFamily="49" charset="0"/>
+              </a:rPr>
+              <a:t>(e: </a:t>
+            </a:r>
+            <a:r>
+              <a:rPr lang="nl-NL" sz="2800" dirty="0" err="1" smtClean="0">
+                <a:latin typeface="Consolas" panose="020B0609020204030204" pitchFamily="49" charset="0"/>
+                <a:cs typeface="Consolas" panose="020B0609020204030204" pitchFamily="49" charset="0"/>
+              </a:rPr>
+              <a:t>Throwable</a:t>
+            </a:r>
+            <a:r>
+              <a:rPr lang="nl-NL" sz="2800" dirty="0" smtClean="0">
+                <a:latin typeface="Consolas" panose="020B0609020204030204" pitchFamily="49" charset="0"/>
+                <a:cs typeface="Consolas" panose="020B0609020204030204" pitchFamily="49" charset="0"/>
+              </a:rPr>
+              <a:t>): Unit</a:t>
+            </a:r>
+          </a:p>
+          <a:p>
+            <a:pPr marL="0" indent="0">
+              <a:buNone/>
+            </a:pPr>
+            <a:r>
+              <a:rPr lang="nl-NL" sz="2800" dirty="0" smtClean="0">
+                <a:latin typeface="Consolas" panose="020B0609020204030204" pitchFamily="49" charset="0"/>
+                <a:cs typeface="Consolas" panose="020B0609020204030204" pitchFamily="49" charset="0"/>
+              </a:rPr>
+              <a:t>  </a:t>
+            </a:r>
+            <a:r>
+              <a:rPr lang="nl-NL" sz="2800" b="1" dirty="0" err="1">
+                <a:solidFill>
+                  <a:srgbClr val="7F0055"/>
+                </a:solidFill>
+                <a:latin typeface="Consolas" panose="020B0609020204030204" pitchFamily="49" charset="0"/>
+                <a:cs typeface="Consolas" panose="020B0609020204030204" pitchFamily="49" charset="0"/>
+              </a:rPr>
+              <a:t>def</a:t>
+            </a:r>
+            <a:r>
+              <a:rPr lang="nl-NL" sz="2800" dirty="0">
+                <a:solidFill>
+                  <a:srgbClr val="7F0055"/>
+                </a:solidFill>
+                <a:latin typeface="Consolas" panose="020B0609020204030204" pitchFamily="49" charset="0"/>
+                <a:cs typeface="Consolas" panose="020B0609020204030204" pitchFamily="49" charset="0"/>
+              </a:rPr>
+              <a:t> </a:t>
+            </a:r>
+            <a:r>
+              <a:rPr lang="nl-NL" sz="2800" dirty="0" err="1" smtClean="0">
+                <a:latin typeface="Consolas" panose="020B0609020204030204" pitchFamily="49" charset="0"/>
+                <a:cs typeface="Consolas" panose="020B0609020204030204" pitchFamily="49" charset="0"/>
+              </a:rPr>
+              <a:t>inCompleted</a:t>
+            </a:r>
+            <a:r>
+              <a:rPr lang="nl-NL" sz="2800" dirty="0" smtClean="0">
+                <a:latin typeface="Consolas" panose="020B0609020204030204" pitchFamily="49" charset="0"/>
+                <a:cs typeface="Consolas" panose="020B0609020204030204" pitchFamily="49" charset="0"/>
+              </a:rPr>
+              <a:t>(): </a:t>
+            </a:r>
+            <a:r>
+              <a:rPr lang="nl-NL" sz="2800" dirty="0">
+                <a:latin typeface="Consolas" panose="020B0609020204030204" pitchFamily="49" charset="0"/>
+                <a:cs typeface="Consolas" panose="020B0609020204030204" pitchFamily="49" charset="0"/>
+              </a:rPr>
+              <a:t>Unit</a:t>
+            </a:r>
+          </a:p>
+          <a:p>
+            <a:pPr marL="0" indent="0">
+              <a:buNone/>
+            </a:pPr>
+            <a:r>
+              <a:rPr lang="nl-NL" sz="2800" dirty="0">
+                <a:latin typeface="Consolas" panose="020B0609020204030204" pitchFamily="49" charset="0"/>
+                <a:cs typeface="Consolas" panose="020B0609020204030204" pitchFamily="49" charset="0"/>
+              </a:rPr>
+              <a:t>  </a:t>
+            </a:r>
+            <a:r>
+              <a:rPr lang="nl-NL" sz="2800" b="1" dirty="0" err="1">
+                <a:solidFill>
+                  <a:srgbClr val="7F0055"/>
+                </a:solidFill>
+                <a:latin typeface="Consolas" panose="020B0609020204030204" pitchFamily="49" charset="0"/>
+                <a:cs typeface="Consolas" panose="020B0609020204030204" pitchFamily="49" charset="0"/>
+              </a:rPr>
+              <a:t>def</a:t>
+            </a:r>
+            <a:r>
+              <a:rPr lang="nl-NL" sz="2800" dirty="0">
+                <a:solidFill>
+                  <a:srgbClr val="7F0055"/>
+                </a:solidFill>
+                <a:latin typeface="Consolas" panose="020B0609020204030204" pitchFamily="49" charset="0"/>
+                <a:cs typeface="Consolas" panose="020B0609020204030204" pitchFamily="49" charset="0"/>
+              </a:rPr>
+              <a:t> </a:t>
+            </a:r>
+            <a:r>
+              <a:rPr lang="nl-NL" sz="2800" dirty="0">
+                <a:latin typeface="Consolas" panose="020B0609020204030204" pitchFamily="49" charset="0"/>
+                <a:cs typeface="Consolas" panose="020B0609020204030204" pitchFamily="49" charset="0"/>
+              </a:rPr>
+              <a:t>out: </a:t>
+            </a:r>
+            <a:r>
+              <a:rPr lang="nl-NL" sz="2800" dirty="0" err="1">
+                <a:latin typeface="Consolas" panose="020B0609020204030204" pitchFamily="49" charset="0"/>
+                <a:cs typeface="Consolas" panose="020B0609020204030204" pitchFamily="49" charset="0"/>
+              </a:rPr>
+              <a:t>Observable</a:t>
+            </a:r>
+            <a:r>
+              <a:rPr lang="nl-NL" sz="2800" dirty="0">
+                <a:latin typeface="Consolas" panose="020B0609020204030204" pitchFamily="49" charset="0"/>
+                <a:cs typeface="Consolas" panose="020B0609020204030204" pitchFamily="49" charset="0"/>
+              </a:rPr>
+              <a:t>[O]</a:t>
+            </a:r>
+          </a:p>
+          <a:p>
+            <a:pPr marL="0" indent="0">
+              <a:buNone/>
+            </a:pPr>
+            <a:r>
+              <a:rPr lang="nl-NL" sz="2800" dirty="0">
+                <a:latin typeface="Consolas" panose="020B0609020204030204" pitchFamily="49" charset="0"/>
+                <a:cs typeface="Consolas" panose="020B0609020204030204" pitchFamily="49" charset="0"/>
+              </a:rPr>
+              <a:t>}</a:t>
+            </a:r>
+            <a:r>
+              <a:rPr lang="nl-NL" sz="2800" dirty="0">
+                <a:solidFill>
+                  <a:srgbClr val="3F7F5F"/>
+                </a:solidFill>
+                <a:latin typeface="Consolas" panose="020B0609020204030204" pitchFamily="49" charset="0"/>
+                <a:cs typeface="Consolas" panose="020B0609020204030204" pitchFamily="49" charset="0"/>
+              </a:rPr>
+              <a:t>    // </a:t>
+            </a:r>
+            <a:r>
+              <a:rPr lang="nl-NL" sz="2800" dirty="0" err="1" smtClean="0">
+                <a:solidFill>
+                  <a:srgbClr val="3F7F5F"/>
+                </a:solidFill>
+                <a:latin typeface="Consolas" panose="020B0609020204030204" pitchFamily="49" charset="0"/>
+                <a:cs typeface="Consolas" panose="020B0609020204030204" pitchFamily="49" charset="0"/>
+              </a:rPr>
+              <a:t>this</a:t>
+            </a:r>
+            <a:r>
+              <a:rPr lang="nl-NL" sz="2800" dirty="0" smtClean="0">
+                <a:solidFill>
+                  <a:srgbClr val="3F7F5F"/>
+                </a:solidFill>
+                <a:latin typeface="Consolas" panose="020B0609020204030204" pitchFamily="49" charset="0"/>
+                <a:cs typeface="Consolas" panose="020B0609020204030204" pitchFamily="49" charset="0"/>
+              </a:rPr>
+              <a:t> is </a:t>
+            </a:r>
+            <a:r>
+              <a:rPr lang="nl-NL" sz="2800" dirty="0" err="1" smtClean="0">
+                <a:solidFill>
+                  <a:srgbClr val="3F7F5F"/>
+                </a:solidFill>
+                <a:latin typeface="Consolas" panose="020B0609020204030204" pitchFamily="49" charset="0"/>
+                <a:cs typeface="Consolas" panose="020B0609020204030204" pitchFamily="49" charset="0"/>
+              </a:rPr>
+              <a:t>the</a:t>
+            </a:r>
+            <a:r>
+              <a:rPr lang="nl-NL" sz="2800" dirty="0" smtClean="0">
+                <a:solidFill>
+                  <a:srgbClr val="3F7F5F"/>
+                </a:solidFill>
+                <a:latin typeface="Consolas" panose="020B0609020204030204" pitchFamily="49" charset="0"/>
+                <a:cs typeface="Consolas" panose="020B0609020204030204" pitchFamily="49" charset="0"/>
+              </a:rPr>
+              <a:t> </a:t>
+            </a:r>
+            <a:r>
+              <a:rPr lang="nl-NL" sz="2800" dirty="0" err="1" smtClean="0">
+                <a:solidFill>
+                  <a:srgbClr val="3F7F5F"/>
+                </a:solidFill>
+                <a:latin typeface="Consolas" panose="020B0609020204030204" pitchFamily="49" charset="0"/>
+                <a:cs typeface="Consolas" panose="020B0609020204030204" pitchFamily="49" charset="0"/>
+              </a:rPr>
+              <a:t>signature</a:t>
+            </a:r>
+            <a:r>
+              <a:rPr lang="nl-NL" sz="2800" dirty="0" smtClean="0">
+                <a:solidFill>
+                  <a:srgbClr val="3F7F5F"/>
+                </a:solidFill>
+                <a:latin typeface="Consolas" panose="020B0609020204030204" pitchFamily="49" charset="0"/>
+                <a:cs typeface="Consolas" panose="020B0609020204030204" pitchFamily="49" charset="0"/>
+              </a:rPr>
+              <a:t> of </a:t>
+            </a:r>
+            <a:r>
+              <a:rPr lang="nl-NL" sz="2800" dirty="0" err="1" smtClean="0">
+                <a:solidFill>
+                  <a:srgbClr val="3F7F5F"/>
+                </a:solidFill>
+                <a:latin typeface="Consolas" panose="020B0609020204030204" pitchFamily="49" charset="0"/>
+                <a:cs typeface="Consolas" panose="020B0609020204030204" pitchFamily="49" charset="0"/>
+              </a:rPr>
+              <a:t>Observer</a:t>
+            </a:r>
+            <a:r>
+              <a:rPr lang="nl-NL" sz="2800" dirty="0" smtClean="0">
+                <a:solidFill>
+                  <a:srgbClr val="3F7F5F"/>
+                </a:solidFill>
+                <a:latin typeface="Consolas" panose="020B0609020204030204" pitchFamily="49" charset="0"/>
+                <a:cs typeface="Consolas" panose="020B0609020204030204" pitchFamily="49" charset="0"/>
+              </a:rPr>
+              <a:t>!</a:t>
+            </a:r>
+          </a:p>
+          <a:p>
+            <a:pPr marL="0" indent="0">
+              <a:buNone/>
+            </a:pPr>
+            <a:r>
+              <a:rPr lang="nl-NL" sz="2800" b="1" dirty="0" err="1">
+                <a:solidFill>
+                  <a:srgbClr val="7F0055"/>
+                </a:solidFill>
+                <a:latin typeface="Consolas" panose="020B0609020204030204" pitchFamily="49" charset="0"/>
+                <a:cs typeface="Consolas" panose="020B0609020204030204" pitchFamily="49" charset="0"/>
+              </a:rPr>
+              <a:t>trait</a:t>
+            </a:r>
+            <a:r>
+              <a:rPr lang="nl-NL" sz="2800" dirty="0">
+                <a:solidFill>
+                  <a:srgbClr val="7F0055"/>
+                </a:solidFill>
+                <a:latin typeface="Consolas" panose="020B0609020204030204" pitchFamily="49" charset="0"/>
+                <a:cs typeface="Consolas" panose="020B0609020204030204" pitchFamily="49" charset="0"/>
+              </a:rPr>
+              <a:t> </a:t>
+            </a:r>
+            <a:r>
+              <a:rPr lang="nl-NL" sz="2800" dirty="0">
+                <a:latin typeface="Consolas" panose="020B0609020204030204" pitchFamily="49" charset="0"/>
+                <a:cs typeface="Consolas" panose="020B0609020204030204" pitchFamily="49" charset="0"/>
+              </a:rPr>
+              <a:t>Component[I, O</a:t>
+            </a:r>
+            <a:r>
+              <a:rPr lang="nl-NL" sz="2800" dirty="0" smtClean="0">
+                <a:latin typeface="Consolas" panose="020B0609020204030204" pitchFamily="49" charset="0"/>
+                <a:cs typeface="Consolas" panose="020B0609020204030204" pitchFamily="49" charset="0"/>
+              </a:rPr>
+              <a:t>] </a:t>
+            </a:r>
+            <a:r>
+              <a:rPr lang="nl-NL" sz="2800" b="1" dirty="0" err="1">
+                <a:solidFill>
+                  <a:srgbClr val="7F0055"/>
+                </a:solidFill>
+                <a:latin typeface="Consolas" panose="020B0609020204030204" pitchFamily="49" charset="0"/>
+                <a:cs typeface="Consolas" panose="020B0609020204030204" pitchFamily="49" charset="0"/>
+              </a:rPr>
+              <a:t>extends</a:t>
+            </a:r>
+            <a:r>
+              <a:rPr lang="nl-NL" sz="2800" dirty="0" smtClean="0">
+                <a:latin typeface="Consolas" panose="020B0609020204030204" pitchFamily="49" charset="0"/>
+                <a:cs typeface="Consolas" panose="020B0609020204030204" pitchFamily="49" charset="0"/>
+              </a:rPr>
+              <a:t> </a:t>
+            </a:r>
+            <a:r>
+              <a:rPr lang="nl-NL" sz="2800" dirty="0" err="1" smtClean="0">
+                <a:latin typeface="Consolas" panose="020B0609020204030204" pitchFamily="49" charset="0"/>
+                <a:cs typeface="Consolas" panose="020B0609020204030204" pitchFamily="49" charset="0"/>
+              </a:rPr>
+              <a:t>Observer</a:t>
+            </a:r>
+            <a:r>
+              <a:rPr lang="nl-NL" sz="2800" dirty="0" smtClean="0">
+                <a:latin typeface="Consolas" panose="020B0609020204030204" pitchFamily="49" charset="0"/>
+                <a:cs typeface="Consolas" panose="020B0609020204030204" pitchFamily="49" charset="0"/>
+              </a:rPr>
+              <a:t>[I] {</a:t>
+            </a:r>
+          </a:p>
+          <a:p>
+            <a:pPr marL="0" indent="0">
+              <a:buNone/>
+            </a:pPr>
+            <a:r>
+              <a:rPr lang="nl-NL" sz="2800" dirty="0" smtClean="0">
+                <a:latin typeface="Consolas" panose="020B0609020204030204" pitchFamily="49" charset="0"/>
+                <a:cs typeface="Consolas" panose="020B0609020204030204" pitchFamily="49" charset="0"/>
+              </a:rPr>
+              <a:t>  </a:t>
+            </a:r>
+            <a:r>
+              <a:rPr lang="nl-NL" sz="2800" b="1" dirty="0" err="1" smtClean="0">
+                <a:solidFill>
+                  <a:srgbClr val="7F0055"/>
+                </a:solidFill>
+                <a:latin typeface="Consolas" panose="020B0609020204030204" pitchFamily="49" charset="0"/>
+                <a:cs typeface="Consolas" panose="020B0609020204030204" pitchFamily="49" charset="0"/>
+              </a:rPr>
+              <a:t>def</a:t>
+            </a:r>
+            <a:r>
+              <a:rPr lang="nl-NL" sz="2800" dirty="0" smtClean="0">
+                <a:solidFill>
+                  <a:srgbClr val="7F0055"/>
+                </a:solidFill>
+                <a:latin typeface="Consolas" panose="020B0609020204030204" pitchFamily="49" charset="0"/>
+                <a:cs typeface="Consolas" panose="020B0609020204030204" pitchFamily="49" charset="0"/>
+              </a:rPr>
+              <a:t> </a:t>
+            </a:r>
+            <a:r>
+              <a:rPr lang="nl-NL" sz="2800" dirty="0" smtClean="0">
+                <a:latin typeface="Consolas" panose="020B0609020204030204" pitchFamily="49" charset="0"/>
+                <a:cs typeface="Consolas" panose="020B0609020204030204" pitchFamily="49" charset="0"/>
+              </a:rPr>
+              <a:t>out: </a:t>
+            </a:r>
+            <a:r>
+              <a:rPr lang="nl-NL" sz="2800" dirty="0" err="1" smtClean="0">
+                <a:latin typeface="Consolas" panose="020B0609020204030204" pitchFamily="49" charset="0"/>
+                <a:cs typeface="Consolas" panose="020B0609020204030204" pitchFamily="49" charset="0"/>
+              </a:rPr>
+              <a:t>Observable</a:t>
+            </a:r>
+            <a:r>
+              <a:rPr lang="nl-NL" sz="2800" dirty="0" smtClean="0">
+                <a:latin typeface="Consolas" panose="020B0609020204030204" pitchFamily="49" charset="0"/>
+                <a:cs typeface="Consolas" panose="020B0609020204030204" pitchFamily="49" charset="0"/>
+              </a:rPr>
+              <a:t>[O]</a:t>
+            </a:r>
+          </a:p>
+          <a:p>
+            <a:pPr marL="0" indent="0">
+              <a:buNone/>
+            </a:pPr>
+            <a:r>
+              <a:rPr lang="nl-NL" sz="2800" dirty="0" smtClean="0">
+                <a:latin typeface="Consolas" panose="020B0609020204030204" pitchFamily="49" charset="0"/>
+                <a:cs typeface="Consolas" panose="020B0609020204030204" pitchFamily="49" charset="0"/>
+              </a:rPr>
+              <a:t>}    </a:t>
+            </a:r>
+            <a:r>
+              <a:rPr lang="nl-NL" sz="2800" dirty="0" smtClean="0">
+                <a:solidFill>
+                  <a:srgbClr val="3F7F5F"/>
+                </a:solidFill>
+                <a:latin typeface="Consolas" panose="020B0609020204030204" pitchFamily="49" charset="0"/>
+                <a:cs typeface="Consolas" panose="020B0609020204030204" pitchFamily="49" charset="0"/>
+              </a:rPr>
+              <a:t>// </a:t>
+            </a:r>
+            <a:r>
+              <a:rPr lang="nl-NL" sz="2800" dirty="0" err="1">
+                <a:solidFill>
+                  <a:srgbClr val="3F7F5F"/>
+                </a:solidFill>
+                <a:latin typeface="Consolas" panose="020B0609020204030204" pitchFamily="49" charset="0"/>
+                <a:cs typeface="Consolas" panose="020B0609020204030204" pitchFamily="49" charset="0"/>
+              </a:rPr>
+              <a:t>this</a:t>
+            </a:r>
+            <a:r>
+              <a:rPr lang="nl-NL" sz="2800" dirty="0">
+                <a:solidFill>
+                  <a:srgbClr val="3F7F5F"/>
+                </a:solidFill>
+                <a:latin typeface="Consolas" panose="020B0609020204030204" pitchFamily="49" charset="0"/>
+                <a:cs typeface="Consolas" panose="020B0609020204030204" pitchFamily="49" charset="0"/>
+              </a:rPr>
+              <a:t> is like a Subject </a:t>
+            </a:r>
+            <a:r>
+              <a:rPr lang="nl-NL" sz="2800" dirty="0" err="1">
+                <a:solidFill>
+                  <a:srgbClr val="3F7F5F"/>
+                </a:solidFill>
+                <a:latin typeface="Consolas" panose="020B0609020204030204" pitchFamily="49" charset="0"/>
+                <a:cs typeface="Consolas" panose="020B0609020204030204" pitchFamily="49" charset="0"/>
+              </a:rPr>
+              <a:t>from</a:t>
+            </a:r>
+            <a:r>
+              <a:rPr lang="nl-NL" sz="2800" dirty="0">
+                <a:solidFill>
+                  <a:srgbClr val="3F7F5F"/>
+                </a:solidFill>
+                <a:latin typeface="Consolas" panose="020B0609020204030204" pitchFamily="49" charset="0"/>
+                <a:cs typeface="Consolas" panose="020B0609020204030204" pitchFamily="49" charset="0"/>
+              </a:rPr>
+              <a:t> I </a:t>
+            </a:r>
+            <a:r>
+              <a:rPr lang="nl-NL" sz="2800" dirty="0" err="1">
+                <a:solidFill>
+                  <a:srgbClr val="3F7F5F"/>
+                </a:solidFill>
+                <a:latin typeface="Consolas" panose="020B0609020204030204" pitchFamily="49" charset="0"/>
+                <a:cs typeface="Consolas" panose="020B0609020204030204" pitchFamily="49" charset="0"/>
+              </a:rPr>
+              <a:t>to</a:t>
+            </a:r>
+            <a:r>
+              <a:rPr lang="nl-NL" sz="2800" dirty="0">
+                <a:solidFill>
+                  <a:srgbClr val="3F7F5F"/>
+                </a:solidFill>
+                <a:latin typeface="Consolas" panose="020B0609020204030204" pitchFamily="49" charset="0"/>
+                <a:cs typeface="Consolas" panose="020B0609020204030204" pitchFamily="49" charset="0"/>
+              </a:rPr>
+              <a:t> O!</a:t>
+            </a:r>
+          </a:p>
+        </p:txBody>
+      </p:sp>
+      <p:sp>
+        <p:nvSpPr>
+          <p:cNvPr id="7" name="Titel 3"/>
+          <p:cNvSpPr txBox="1">
+            <a:spLocks/>
+          </p:cNvSpPr>
+          <p:nvPr/>
+        </p:nvSpPr>
+        <p:spPr>
+          <a:xfrm>
+            <a:off x="457200" y="116632"/>
+            <a:ext cx="8229600" cy="720080"/>
+          </a:xfrm>
+          <a:prstGeom prst="rect">
+            <a:avLst/>
+          </a:prstGeom>
+        </p:spPr>
+        <p:txBody>
+          <a:bodyPr vert="horz" lIns="91440" tIns="45720" rIns="91440" bIns="45720" rtlCol="0" anchor="ctr">
+            <a:normAutofit lnSpcReduction="10000"/>
+          </a:bodyPr>
+          <a:lstStyle>
+            <a:lvl1pPr algn="ctr" defTabSz="914400" rtl="0" eaLnBrk="1" latinLnBrk="0" hangingPunct="1">
+              <a:spcBef>
+                <a:spcPct val="0"/>
+              </a:spcBef>
+              <a:buNone/>
+              <a:defRPr sz="4400" kern="1200">
+                <a:solidFill>
+                  <a:schemeClr val="tx1"/>
+                </a:solidFill>
+                <a:latin typeface="+mj-lt"/>
+                <a:ea typeface="+mj-ea"/>
+                <a:cs typeface="+mj-cs"/>
+              </a:defRPr>
+            </a:lvl1pPr>
+          </a:lstStyle>
+          <a:p>
+            <a:r>
+              <a:rPr lang="nl-NL" dirty="0" err="1" smtClean="0"/>
+              <a:t>Derivation</a:t>
+            </a:r>
+            <a:r>
+              <a:rPr lang="nl-NL" dirty="0" smtClean="0"/>
+              <a:t> </a:t>
+            </a:r>
+            <a:r>
+              <a:rPr lang="nl-NL" sz="3600" dirty="0" smtClean="0">
+                <a:latin typeface="Consolas" panose="020B0609020204030204" pitchFamily="49" charset="0"/>
+                <a:cs typeface="Consolas" panose="020B0609020204030204" pitchFamily="49" charset="0"/>
+              </a:rPr>
+              <a:t>Component</a:t>
+            </a:r>
+            <a:r>
+              <a:rPr lang="nl-NL" dirty="0" smtClean="0"/>
+              <a:t> interface </a:t>
+            </a:r>
+            <a:endParaRPr lang="nl-NL" dirty="0"/>
+          </a:p>
+        </p:txBody>
+      </p:sp>
+      <p:grpSp>
+        <p:nvGrpSpPr>
+          <p:cNvPr id="4" name="Groep 3"/>
+          <p:cNvGrpSpPr/>
+          <p:nvPr/>
+        </p:nvGrpSpPr>
+        <p:grpSpPr>
+          <a:xfrm>
+            <a:off x="1007604" y="5805264"/>
+            <a:ext cx="7128792" cy="548481"/>
+            <a:chOff x="755576" y="980728"/>
+            <a:chExt cx="7128792" cy="548481"/>
+          </a:xfrm>
+        </p:grpSpPr>
+        <p:sp>
+          <p:nvSpPr>
+            <p:cNvPr id="6" name="Tekstvak 5"/>
+            <p:cNvSpPr txBox="1"/>
+            <p:nvPr/>
+          </p:nvSpPr>
+          <p:spPr>
+            <a:xfrm>
+              <a:off x="2843808" y="980728"/>
+              <a:ext cx="2664296" cy="369332"/>
+            </a:xfrm>
+            <a:prstGeom prst="rect">
+              <a:avLst/>
+            </a:prstGeom>
+            <a:noFill/>
+          </p:spPr>
+          <p:txBody>
+            <a:bodyPr wrap="square" rtlCol="0">
+              <a:spAutoFit/>
+            </a:bodyPr>
+            <a:lstStyle/>
+            <a:p>
+              <a:pPr algn="ctr"/>
+              <a:r>
+                <a:rPr lang="nl-NL" dirty="0" err="1" smtClean="0">
+                  <a:latin typeface="Consolas" panose="020B0609020204030204" pitchFamily="49" charset="0"/>
+                  <a:cs typeface="Consolas" panose="020B0609020204030204" pitchFamily="49" charset="0"/>
+                </a:rPr>
+                <a:t>transformer</a:t>
+              </a:r>
+              <a:r>
+                <a:rPr lang="nl-NL" dirty="0" smtClean="0">
+                  <a:latin typeface="Consolas" panose="020B0609020204030204" pitchFamily="49" charset="0"/>
+                  <a:cs typeface="Consolas" panose="020B0609020204030204" pitchFamily="49" charset="0"/>
+                </a:rPr>
+                <a:t> I </a:t>
+              </a:r>
+              <a:r>
+                <a:rPr lang="nl-NL" dirty="0" err="1" smtClean="0">
+                  <a:latin typeface="Consolas" panose="020B0609020204030204" pitchFamily="49" charset="0"/>
+                  <a:cs typeface="Consolas" panose="020B0609020204030204" pitchFamily="49" charset="0"/>
+                </a:rPr>
+                <a:t>to</a:t>
+              </a:r>
+              <a:r>
+                <a:rPr lang="nl-NL" dirty="0" smtClean="0">
+                  <a:latin typeface="Consolas" panose="020B0609020204030204" pitchFamily="49" charset="0"/>
+                  <a:cs typeface="Consolas" panose="020B0609020204030204" pitchFamily="49" charset="0"/>
+                </a:rPr>
+                <a:t> O</a:t>
+              </a:r>
+              <a:endParaRPr lang="nl-NL" dirty="0">
+                <a:latin typeface="Consolas" panose="020B0609020204030204" pitchFamily="49" charset="0"/>
+                <a:cs typeface="Consolas" panose="020B0609020204030204" pitchFamily="49" charset="0"/>
+              </a:endParaRPr>
+            </a:p>
+          </p:txBody>
+        </p:sp>
+        <p:sp>
+          <p:nvSpPr>
+            <p:cNvPr id="8" name="Tekstvak 7"/>
+            <p:cNvSpPr txBox="1"/>
+            <p:nvPr/>
+          </p:nvSpPr>
+          <p:spPr>
+            <a:xfrm>
+              <a:off x="755576" y="1067544"/>
+              <a:ext cx="2088232" cy="461665"/>
+            </a:xfrm>
+            <a:prstGeom prst="rect">
+              <a:avLst/>
+            </a:prstGeom>
+            <a:noFill/>
+            <a:ln w="38100">
+              <a:solidFill>
+                <a:schemeClr val="tx1"/>
+              </a:solidFill>
+            </a:ln>
+          </p:spPr>
+          <p:txBody>
+            <a:bodyPr wrap="square" rtlCol="0">
+              <a:spAutoFit/>
+            </a:bodyPr>
+            <a:lstStyle/>
+            <a:p>
+              <a:r>
+                <a:rPr lang="nl-NL" sz="2400" dirty="0" err="1" smtClean="0">
+                  <a:latin typeface="Consolas" panose="020B0609020204030204" pitchFamily="49" charset="0"/>
+                  <a:cs typeface="Consolas" panose="020B0609020204030204" pitchFamily="49" charset="0"/>
+                </a:rPr>
+                <a:t>Observer</a:t>
+              </a:r>
+              <a:r>
+                <a:rPr lang="nl-NL" sz="2400" dirty="0" smtClean="0">
+                  <a:latin typeface="Consolas" panose="020B0609020204030204" pitchFamily="49" charset="0"/>
+                  <a:cs typeface="Consolas" panose="020B0609020204030204" pitchFamily="49" charset="0"/>
+                </a:rPr>
+                <a:t>[I]</a:t>
+              </a:r>
+              <a:endParaRPr lang="nl-NL" sz="2400" dirty="0">
+                <a:latin typeface="Consolas" panose="020B0609020204030204" pitchFamily="49" charset="0"/>
+                <a:cs typeface="Consolas" panose="020B0609020204030204" pitchFamily="49" charset="0"/>
+              </a:endParaRPr>
+            </a:p>
+          </p:txBody>
+        </p:sp>
+        <p:sp>
+          <p:nvSpPr>
+            <p:cNvPr id="9" name="Tekstvak 8"/>
+            <p:cNvSpPr txBox="1"/>
+            <p:nvPr/>
+          </p:nvSpPr>
+          <p:spPr>
+            <a:xfrm>
+              <a:off x="5508104" y="1067544"/>
+              <a:ext cx="2376264" cy="461665"/>
+            </a:xfrm>
+            <a:prstGeom prst="rect">
+              <a:avLst/>
+            </a:prstGeom>
+            <a:noFill/>
+            <a:ln w="38100">
+              <a:solidFill>
+                <a:schemeClr val="tx1"/>
+              </a:solidFill>
+            </a:ln>
+          </p:spPr>
+          <p:txBody>
+            <a:bodyPr wrap="square" rtlCol="0">
+              <a:spAutoFit/>
+            </a:bodyPr>
+            <a:lstStyle/>
+            <a:p>
+              <a:r>
+                <a:rPr lang="nl-NL" sz="2400" dirty="0" err="1" smtClean="0">
+                  <a:latin typeface="Consolas" panose="020B0609020204030204" pitchFamily="49" charset="0"/>
+                  <a:cs typeface="Consolas" panose="020B0609020204030204" pitchFamily="49" charset="0"/>
+                </a:rPr>
+                <a:t>Observable</a:t>
+              </a:r>
+              <a:r>
+                <a:rPr lang="nl-NL" sz="2400" dirty="0" smtClean="0">
+                  <a:latin typeface="Consolas" panose="020B0609020204030204" pitchFamily="49" charset="0"/>
+                  <a:cs typeface="Consolas" panose="020B0609020204030204" pitchFamily="49" charset="0"/>
+                </a:rPr>
+                <a:t>[O]</a:t>
+              </a:r>
+              <a:endParaRPr lang="nl-NL" sz="2400" dirty="0">
+                <a:latin typeface="Consolas" panose="020B0609020204030204" pitchFamily="49" charset="0"/>
+                <a:cs typeface="Consolas" panose="020B0609020204030204" pitchFamily="49" charset="0"/>
+              </a:endParaRPr>
+            </a:p>
+          </p:txBody>
+        </p:sp>
+        <p:cxnSp>
+          <p:nvCxnSpPr>
+            <p:cNvPr id="10" name="Rechte verbindingslijn met pijl 9"/>
+            <p:cNvCxnSpPr>
+              <a:stCxn id="8" idx="3"/>
+              <a:endCxn id="9" idx="1"/>
+            </p:cNvCxnSpPr>
+            <p:nvPr/>
+          </p:nvCxnSpPr>
+          <p:spPr>
+            <a:xfrm>
+              <a:off x="2843808" y="1298377"/>
+              <a:ext cx="2664296" cy="0"/>
+            </a:xfrm>
+            <a:prstGeom prst="straightConnector1">
+              <a:avLst/>
+            </a:prstGeom>
+            <a:ln w="38100">
+              <a:solidFill>
+                <a:schemeClr val="tx1"/>
+              </a:solidFill>
+              <a:tailEnd type="stealth" w="lg" len="lg"/>
+            </a:ln>
+          </p:spPr>
+          <p:style>
+            <a:lnRef idx="1">
+              <a:schemeClr val="accent1"/>
+            </a:lnRef>
+            <a:fillRef idx="0">
+              <a:schemeClr val="accent1"/>
+            </a:fillRef>
+            <a:effectRef idx="0">
+              <a:schemeClr val="accent1"/>
+            </a:effectRef>
+            <a:fontRef idx="minor">
+              <a:schemeClr val="tx1"/>
+            </a:fontRef>
+          </p:style>
+        </p:cxnSp>
+      </p:grpSp>
+    </p:spTree>
+    <p:extLst>
+      <p:ext uri="{BB962C8B-B14F-4D97-AF65-F5344CB8AC3E}">
+        <p14:creationId xmlns:p14="http://schemas.microsoft.com/office/powerpoint/2010/main" val="3575716207"/>
+      </p:ext>
+    </p:extLst>
+  </p:cSld>
+  <p:clrMapOvr>
+    <a:masterClrMapping/>
+  </p:clrMapOvr>
+  <p:timing>
+    <p:tnLst>
+      <p:par>
+        <p:cTn id="1" dur="indefinite" restart="never" nodeType="tmRoot"/>
+      </p:par>
+    </p:tnLst>
+  </p:timing>
+</p:sld>
+</file>
+
+<file path=ppt/slides/slide26.xml><?xml version="1.0" encoding="utf-8"?>
+<p:sld xmlns:a="http://schemas.openxmlformats.org/drawingml/2006/main" xmlns:r="http://schemas.openxmlformats.org/officeDocument/2006/relationships" xmlns:p="http://schemas.openxmlformats.org/presentationml/2006/main">
+  <p:cSld>
+    <p:spTree>
+      <p:nvGrpSpPr>
+        <p:cNvPr id="1" name=""/>
+        <p:cNvGrpSpPr/>
+        <p:nvPr/>
+      </p:nvGrpSpPr>
+      <p:grpSpPr>
+        <a:xfrm>
+          <a:off x="0" y="0"/>
+          <a:ext cx="0" cy="0"/>
+          <a:chOff x="0" y="0"/>
+          <a:chExt cx="0" cy="0"/>
+        </a:xfrm>
+      </p:grpSpPr>
+      <p:sp>
+        <p:nvSpPr>
+          <p:cNvPr id="5" name="Tijdelijke aanduiding voor inhoud 4"/>
+          <p:cNvSpPr>
+            <a:spLocks noGrp="1"/>
+          </p:cNvSpPr>
+          <p:nvPr>
+            <p:ph idx="1"/>
+          </p:nvPr>
+        </p:nvSpPr>
+        <p:spPr>
+          <a:xfrm>
+            <a:off x="0" y="836712"/>
+            <a:ext cx="9144000" cy="6021288"/>
+          </a:xfrm>
+        </p:spPr>
+        <p:txBody>
+          <a:bodyPr>
+            <a:normAutofit fontScale="92500"/>
+          </a:bodyPr>
+          <a:lstStyle/>
+          <a:p>
+            <a:pPr marL="0" indent="0">
+              <a:buNone/>
+            </a:pPr>
+            <a:r>
+              <a:rPr lang="nl-NL" sz="2800" b="1" dirty="0" err="1" smtClean="0">
+                <a:solidFill>
+                  <a:srgbClr val="7F0055"/>
+                </a:solidFill>
+                <a:latin typeface="Consolas" panose="020B0609020204030204" pitchFamily="49" charset="0"/>
+                <a:cs typeface="Consolas" panose="020B0609020204030204" pitchFamily="49" charset="0"/>
+              </a:rPr>
+              <a:t>trait</a:t>
+            </a:r>
+            <a:r>
+              <a:rPr lang="nl-NL" sz="2800" dirty="0" smtClean="0">
+                <a:solidFill>
+                  <a:srgbClr val="7F0055"/>
+                </a:solidFill>
+                <a:latin typeface="Consolas" panose="020B0609020204030204" pitchFamily="49" charset="0"/>
+                <a:cs typeface="Consolas" panose="020B0609020204030204" pitchFamily="49" charset="0"/>
+              </a:rPr>
+              <a:t> </a:t>
+            </a:r>
+            <a:r>
+              <a:rPr lang="nl-NL" sz="2800" dirty="0" smtClean="0">
+                <a:latin typeface="Consolas" panose="020B0609020204030204" pitchFamily="49" charset="0"/>
+                <a:cs typeface="Consolas" panose="020B0609020204030204" pitchFamily="49" charset="0"/>
+              </a:rPr>
+              <a:t>Component[I, O] </a:t>
+            </a:r>
+            <a:r>
+              <a:rPr lang="nl-NL" sz="2800" b="1" dirty="0" err="1" smtClean="0">
+                <a:solidFill>
+                  <a:srgbClr val="7F0055"/>
+                </a:solidFill>
+                <a:latin typeface="Consolas" panose="020B0609020204030204" pitchFamily="49" charset="0"/>
+                <a:cs typeface="Consolas" panose="020B0609020204030204" pitchFamily="49" charset="0"/>
+              </a:rPr>
+              <a:t>extends</a:t>
+            </a:r>
+            <a:r>
+              <a:rPr lang="nl-NL" sz="2800" dirty="0" smtClean="0">
+                <a:latin typeface="Consolas" panose="020B0609020204030204" pitchFamily="49" charset="0"/>
+                <a:cs typeface="Consolas" panose="020B0609020204030204" pitchFamily="49" charset="0"/>
+              </a:rPr>
+              <a:t> </a:t>
+            </a:r>
+            <a:r>
+              <a:rPr lang="nl-NL" sz="2800" dirty="0" err="1" smtClean="0">
+                <a:latin typeface="Consolas" panose="020B0609020204030204" pitchFamily="49" charset="0"/>
+                <a:cs typeface="Consolas" panose="020B0609020204030204" pitchFamily="49" charset="0"/>
+              </a:rPr>
+              <a:t>Observer</a:t>
+            </a:r>
+            <a:r>
+              <a:rPr lang="nl-NL" sz="2800" dirty="0" smtClean="0">
+                <a:latin typeface="Consolas" panose="020B0609020204030204" pitchFamily="49" charset="0"/>
+                <a:cs typeface="Consolas" panose="020B0609020204030204" pitchFamily="49" charset="0"/>
+              </a:rPr>
+              <a:t>[I] {</a:t>
+            </a:r>
+          </a:p>
+          <a:p>
+            <a:pPr marL="0" indent="0">
+              <a:buNone/>
+            </a:pPr>
+            <a:r>
+              <a:rPr lang="nl-NL" sz="2800" b="1" dirty="0" smtClean="0">
+                <a:solidFill>
+                  <a:srgbClr val="7F0055"/>
+                </a:solidFill>
+                <a:latin typeface="Consolas" panose="020B0609020204030204" pitchFamily="49" charset="0"/>
+                <a:cs typeface="Consolas" panose="020B0609020204030204" pitchFamily="49" charset="0"/>
+              </a:rPr>
+              <a:t>  val</a:t>
+            </a:r>
+            <a:r>
+              <a:rPr lang="nl-NL" sz="2800" dirty="0" smtClean="0">
+                <a:latin typeface="Consolas" panose="020B0609020204030204" pitchFamily="49" charset="0"/>
+                <a:cs typeface="Consolas" panose="020B0609020204030204" pitchFamily="49" charset="0"/>
+              </a:rPr>
+              <a:t> </a:t>
+            </a:r>
+            <a:r>
+              <a:rPr lang="nl-NL" sz="2800" dirty="0" smtClean="0">
+                <a:solidFill>
+                  <a:srgbClr val="5E5EFF"/>
+                </a:solidFill>
+                <a:latin typeface="Consolas" panose="020B0609020204030204" pitchFamily="49" charset="0"/>
+                <a:cs typeface="Consolas" panose="020B0609020204030204" pitchFamily="49" charset="0"/>
+              </a:rPr>
+              <a:t>subject</a:t>
+            </a:r>
+            <a:r>
+              <a:rPr lang="nl-NL" sz="2800" dirty="0" smtClean="0">
+                <a:latin typeface="Consolas" panose="020B0609020204030204" pitchFamily="49" charset="0"/>
+                <a:cs typeface="Consolas" panose="020B0609020204030204" pitchFamily="49" charset="0"/>
+              </a:rPr>
+              <a:t> = Subject[I]</a:t>
+            </a:r>
+          </a:p>
+          <a:p>
+            <a:pPr marL="0" indent="0">
+              <a:buNone/>
+            </a:pPr>
+            <a:r>
+              <a:rPr lang="nl-NL" sz="2800" b="1" dirty="0" smtClean="0">
+                <a:solidFill>
+                  <a:srgbClr val="7F0055"/>
+                </a:solidFill>
+                <a:latin typeface="Consolas" panose="020B0609020204030204" pitchFamily="49" charset="0"/>
+                <a:cs typeface="Consolas" panose="020B0609020204030204" pitchFamily="49" charset="0"/>
+              </a:rPr>
+              <a:t>  </a:t>
+            </a:r>
+            <a:r>
+              <a:rPr lang="nl-NL" sz="2800" b="1" dirty="0">
+                <a:solidFill>
+                  <a:srgbClr val="7F0055"/>
+                </a:solidFill>
+                <a:latin typeface="Consolas" panose="020B0609020204030204" pitchFamily="49" charset="0"/>
+                <a:cs typeface="Consolas" panose="020B0609020204030204" pitchFamily="49" charset="0"/>
+              </a:rPr>
+              <a:t>val</a:t>
+            </a:r>
+            <a:r>
+              <a:rPr lang="nl-NL" sz="2800" dirty="0">
+                <a:latin typeface="Consolas" panose="020B0609020204030204" pitchFamily="49" charset="0"/>
+                <a:cs typeface="Consolas" panose="020B0609020204030204" pitchFamily="49" charset="0"/>
+              </a:rPr>
+              <a:t> </a:t>
+            </a:r>
+            <a:r>
+              <a:rPr lang="nl-NL" sz="2800" dirty="0" err="1" smtClean="0">
+                <a:solidFill>
+                  <a:srgbClr val="5E5EFF"/>
+                </a:solidFill>
+                <a:latin typeface="Consolas" panose="020B0609020204030204" pitchFamily="49" charset="0"/>
+                <a:cs typeface="Consolas" panose="020B0609020204030204" pitchFamily="49" charset="0"/>
+              </a:rPr>
+              <a:t>observable</a:t>
+            </a:r>
+            <a:r>
+              <a:rPr lang="nl-NL" sz="2800" dirty="0" smtClean="0">
+                <a:solidFill>
+                  <a:srgbClr val="5E5EFF"/>
+                </a:solidFill>
+                <a:latin typeface="Consolas" panose="020B0609020204030204" pitchFamily="49" charset="0"/>
+                <a:cs typeface="Consolas" panose="020B0609020204030204" pitchFamily="49" charset="0"/>
+              </a:rPr>
+              <a:t> </a:t>
+            </a:r>
+            <a:r>
+              <a:rPr lang="nl-NL" sz="2800" dirty="0" smtClean="0">
+                <a:latin typeface="Consolas" panose="020B0609020204030204" pitchFamily="49" charset="0"/>
+                <a:cs typeface="Consolas" panose="020B0609020204030204" pitchFamily="49" charset="0"/>
+              </a:rPr>
+              <a:t>= </a:t>
+            </a:r>
+            <a:r>
+              <a:rPr lang="nl-NL" sz="2800" dirty="0" err="1" smtClean="0">
+                <a:solidFill>
+                  <a:srgbClr val="5E5EFF"/>
+                </a:solidFill>
+                <a:latin typeface="Consolas" panose="020B0609020204030204" pitchFamily="49" charset="0"/>
+                <a:cs typeface="Consolas" panose="020B0609020204030204" pitchFamily="49" charset="0"/>
+              </a:rPr>
+              <a:t>subject</a:t>
+            </a:r>
+            <a:r>
+              <a:rPr lang="nl-NL" sz="2800" dirty="0" err="1" smtClean="0">
+                <a:latin typeface="Consolas" panose="020B0609020204030204" pitchFamily="49" charset="0"/>
+                <a:cs typeface="Consolas" panose="020B0609020204030204" pitchFamily="49" charset="0"/>
+              </a:rPr>
+              <a:t>.publish</a:t>
+            </a:r>
+            <a:r>
+              <a:rPr lang="nl-NL" sz="2800" dirty="0" smtClean="0">
+                <a:latin typeface="Consolas" panose="020B0609020204030204" pitchFamily="49" charset="0"/>
+                <a:cs typeface="Consolas" panose="020B0609020204030204" pitchFamily="49" charset="0"/>
+              </a:rPr>
+              <a:t>(</a:t>
+            </a:r>
+            <a:r>
+              <a:rPr lang="nl-NL" sz="2800" dirty="0" err="1" smtClean="0">
+                <a:latin typeface="Consolas" panose="020B0609020204030204" pitchFamily="49" charset="0"/>
+                <a:cs typeface="Consolas" panose="020B0609020204030204" pitchFamily="49" charset="0"/>
+              </a:rPr>
+              <a:t>transform</a:t>
+            </a:r>
+            <a:r>
+              <a:rPr lang="nl-NL" sz="2800" dirty="0" smtClean="0">
+                <a:latin typeface="Consolas" panose="020B0609020204030204" pitchFamily="49" charset="0"/>
+                <a:cs typeface="Consolas" panose="020B0609020204030204" pitchFamily="49" charset="0"/>
+              </a:rPr>
+              <a:t>)</a:t>
+            </a:r>
+          </a:p>
+          <a:p>
+            <a:pPr marL="0" indent="0">
+              <a:buNone/>
+            </a:pPr>
+            <a:endParaRPr lang="nl-NL" sz="2800" dirty="0">
+              <a:latin typeface="Consolas" panose="020B0609020204030204" pitchFamily="49" charset="0"/>
+              <a:cs typeface="Consolas" panose="020B0609020204030204" pitchFamily="49" charset="0"/>
+            </a:endParaRPr>
+          </a:p>
+          <a:p>
+            <a:pPr marL="0" indent="0">
+              <a:buNone/>
+            </a:pPr>
+            <a:r>
+              <a:rPr lang="nl-NL" sz="2800" dirty="0">
+                <a:latin typeface="Consolas" panose="020B0609020204030204" pitchFamily="49" charset="0"/>
+                <a:cs typeface="Consolas" panose="020B0609020204030204" pitchFamily="49" charset="0"/>
+              </a:rPr>
+              <a:t>  </a:t>
+            </a:r>
+            <a:r>
+              <a:rPr lang="nl-NL" sz="2800" b="1" dirty="0" err="1">
+                <a:solidFill>
+                  <a:srgbClr val="7F0055"/>
+                </a:solidFill>
+                <a:latin typeface="Consolas" panose="020B0609020204030204" pitchFamily="49" charset="0"/>
+                <a:cs typeface="Consolas" panose="020B0609020204030204" pitchFamily="49" charset="0"/>
+              </a:rPr>
+              <a:t>def</a:t>
+            </a:r>
+            <a:r>
+              <a:rPr lang="nl-NL" sz="2800" dirty="0">
+                <a:solidFill>
+                  <a:srgbClr val="7F0055"/>
+                </a:solidFill>
+                <a:latin typeface="Consolas" panose="020B0609020204030204" pitchFamily="49" charset="0"/>
+                <a:cs typeface="Consolas" panose="020B0609020204030204" pitchFamily="49" charset="0"/>
+              </a:rPr>
+              <a:t> </a:t>
+            </a:r>
+            <a:r>
+              <a:rPr lang="nl-NL" sz="2800" dirty="0" err="1" smtClean="0">
+                <a:latin typeface="Consolas" panose="020B0609020204030204" pitchFamily="49" charset="0"/>
+                <a:cs typeface="Consolas" panose="020B0609020204030204" pitchFamily="49" charset="0"/>
+              </a:rPr>
+              <a:t>transform</a:t>
+            </a:r>
+            <a:r>
+              <a:rPr lang="nl-NL" sz="2800" dirty="0" smtClean="0">
+                <a:latin typeface="Consolas" panose="020B0609020204030204" pitchFamily="49" charset="0"/>
+                <a:cs typeface="Consolas" panose="020B0609020204030204" pitchFamily="49" charset="0"/>
+              </a:rPr>
+              <a:t>(i</a:t>
+            </a:r>
+            <a:r>
+              <a:rPr lang="nl-NL" sz="2800" dirty="0">
+                <a:latin typeface="Consolas" panose="020B0609020204030204" pitchFamily="49" charset="0"/>
+                <a:cs typeface="Consolas" panose="020B0609020204030204" pitchFamily="49" charset="0"/>
+              </a:rPr>
+              <a:t>: </a:t>
+            </a:r>
+            <a:r>
+              <a:rPr lang="nl-NL" sz="2800" dirty="0" err="1" smtClean="0">
+                <a:latin typeface="Consolas" panose="020B0609020204030204" pitchFamily="49" charset="0"/>
+                <a:cs typeface="Consolas" panose="020B0609020204030204" pitchFamily="49" charset="0"/>
+              </a:rPr>
+              <a:t>Observable</a:t>
+            </a:r>
+            <a:r>
+              <a:rPr lang="nl-NL" sz="2800" dirty="0" smtClean="0">
+                <a:latin typeface="Consolas" panose="020B0609020204030204" pitchFamily="49" charset="0"/>
+                <a:cs typeface="Consolas" panose="020B0609020204030204" pitchFamily="49" charset="0"/>
+              </a:rPr>
+              <a:t>[I]): </a:t>
+            </a:r>
+            <a:r>
+              <a:rPr lang="nl-NL" sz="2800" dirty="0" err="1" smtClean="0">
+                <a:latin typeface="Consolas" panose="020B0609020204030204" pitchFamily="49" charset="0"/>
+                <a:cs typeface="Consolas" panose="020B0609020204030204" pitchFamily="49" charset="0"/>
+              </a:rPr>
+              <a:t>Observable</a:t>
+            </a:r>
+            <a:r>
+              <a:rPr lang="nl-NL" sz="2800" dirty="0" smtClean="0">
+                <a:latin typeface="Consolas" panose="020B0609020204030204" pitchFamily="49" charset="0"/>
+                <a:cs typeface="Consolas" panose="020B0609020204030204" pitchFamily="49" charset="0"/>
+              </a:rPr>
+              <a:t>[O]</a:t>
+            </a:r>
+            <a:endParaRPr lang="nl-NL" sz="2800" dirty="0">
+              <a:latin typeface="Consolas" panose="020B0609020204030204" pitchFamily="49" charset="0"/>
+              <a:cs typeface="Consolas" panose="020B0609020204030204" pitchFamily="49" charset="0"/>
+            </a:endParaRPr>
+          </a:p>
+          <a:p>
+            <a:pPr marL="0" indent="0">
+              <a:buNone/>
+            </a:pPr>
+            <a:r>
+              <a:rPr lang="nl-NL" sz="2800" dirty="0">
+                <a:latin typeface="Consolas" panose="020B0609020204030204" pitchFamily="49" charset="0"/>
+                <a:cs typeface="Consolas" panose="020B0609020204030204" pitchFamily="49" charset="0"/>
+              </a:rPr>
+              <a:t>  </a:t>
+            </a:r>
+            <a:r>
+              <a:rPr lang="nl-NL" sz="2800" b="1" dirty="0" err="1">
+                <a:solidFill>
+                  <a:srgbClr val="7F0055"/>
+                </a:solidFill>
+                <a:latin typeface="Consolas" panose="020B0609020204030204" pitchFamily="49" charset="0"/>
+                <a:cs typeface="Consolas" panose="020B0609020204030204" pitchFamily="49" charset="0"/>
+              </a:rPr>
+              <a:t>def</a:t>
+            </a:r>
+            <a:r>
+              <a:rPr lang="nl-NL" sz="2800" dirty="0">
+                <a:solidFill>
+                  <a:srgbClr val="7F0055"/>
+                </a:solidFill>
+                <a:latin typeface="Consolas" panose="020B0609020204030204" pitchFamily="49" charset="0"/>
+                <a:cs typeface="Consolas" panose="020B0609020204030204" pitchFamily="49" charset="0"/>
+              </a:rPr>
+              <a:t> </a:t>
+            </a:r>
+            <a:r>
+              <a:rPr lang="nl-NL" sz="2800" dirty="0" err="1" smtClean="0">
+                <a:latin typeface="Consolas" panose="020B0609020204030204" pitchFamily="49" charset="0"/>
+                <a:cs typeface="Consolas" panose="020B0609020204030204" pitchFamily="49" charset="0"/>
+              </a:rPr>
+              <a:t>asObservable</a:t>
+            </a:r>
+            <a:r>
+              <a:rPr lang="nl-NL" sz="2800" dirty="0" smtClean="0">
+                <a:latin typeface="Consolas" panose="020B0609020204030204" pitchFamily="49" charset="0"/>
+                <a:cs typeface="Consolas" panose="020B0609020204030204" pitchFamily="49" charset="0"/>
+              </a:rPr>
+              <a:t>: </a:t>
+            </a:r>
+            <a:r>
+              <a:rPr lang="nl-NL" sz="2800" dirty="0" err="1">
+                <a:latin typeface="Consolas" panose="020B0609020204030204" pitchFamily="49" charset="0"/>
+                <a:cs typeface="Consolas" panose="020B0609020204030204" pitchFamily="49" charset="0"/>
+              </a:rPr>
+              <a:t>Observable</a:t>
+            </a:r>
+            <a:r>
+              <a:rPr lang="nl-NL" sz="2800" dirty="0">
+                <a:latin typeface="Consolas" panose="020B0609020204030204" pitchFamily="49" charset="0"/>
+                <a:cs typeface="Consolas" panose="020B0609020204030204" pitchFamily="49" charset="0"/>
+              </a:rPr>
+              <a:t>[O</a:t>
+            </a:r>
+            <a:r>
+              <a:rPr lang="nl-NL" sz="2800" dirty="0" smtClean="0">
+                <a:latin typeface="Consolas" panose="020B0609020204030204" pitchFamily="49" charset="0"/>
+                <a:cs typeface="Consolas" panose="020B0609020204030204" pitchFamily="49" charset="0"/>
+              </a:rPr>
+              <a:t>] = </a:t>
+            </a:r>
+            <a:r>
+              <a:rPr lang="nl-NL" sz="2800" dirty="0" err="1" smtClean="0">
+                <a:solidFill>
+                  <a:srgbClr val="5E5EFF"/>
+                </a:solidFill>
+                <a:latin typeface="Consolas" panose="020B0609020204030204" pitchFamily="49" charset="0"/>
+                <a:cs typeface="Consolas" panose="020B0609020204030204" pitchFamily="49" charset="0"/>
+              </a:rPr>
+              <a:t>observable</a:t>
+            </a:r>
+            <a:endParaRPr lang="nl-NL" sz="2800" dirty="0" smtClean="0">
+              <a:latin typeface="Consolas" panose="020B0609020204030204" pitchFamily="49" charset="0"/>
+              <a:cs typeface="Consolas" panose="020B0609020204030204" pitchFamily="49" charset="0"/>
+            </a:endParaRPr>
+          </a:p>
+          <a:p>
+            <a:pPr marL="0" indent="0">
+              <a:buNone/>
+            </a:pPr>
+            <a:endParaRPr lang="nl-NL" sz="2800" dirty="0">
+              <a:latin typeface="Consolas" panose="020B0609020204030204" pitchFamily="49" charset="0"/>
+              <a:cs typeface="Consolas" panose="020B0609020204030204" pitchFamily="49" charset="0"/>
+            </a:endParaRPr>
+          </a:p>
+          <a:p>
+            <a:pPr marL="0" indent="0">
+              <a:buNone/>
+            </a:pPr>
+            <a:r>
+              <a:rPr lang="nl-NL" sz="2800" dirty="0" smtClean="0">
+                <a:latin typeface="Consolas" panose="020B0609020204030204" pitchFamily="49" charset="0"/>
+                <a:cs typeface="Consolas" panose="020B0609020204030204" pitchFamily="49" charset="0"/>
+              </a:rPr>
+              <a:t>  </a:t>
+            </a:r>
+            <a:r>
+              <a:rPr lang="nl-NL" sz="2800" b="1" dirty="0" err="1" smtClean="0">
+                <a:solidFill>
+                  <a:srgbClr val="7F0055"/>
+                </a:solidFill>
+                <a:latin typeface="Consolas" panose="020B0609020204030204" pitchFamily="49" charset="0"/>
+                <a:cs typeface="Consolas" panose="020B0609020204030204" pitchFamily="49" charset="0"/>
+              </a:rPr>
+              <a:t>override</a:t>
+            </a:r>
+            <a:r>
+              <a:rPr lang="nl-NL" sz="2800" b="1" dirty="0" smtClean="0">
+                <a:solidFill>
+                  <a:srgbClr val="7F0055"/>
+                </a:solidFill>
+                <a:latin typeface="Consolas" panose="020B0609020204030204" pitchFamily="49" charset="0"/>
+                <a:cs typeface="Consolas" panose="020B0609020204030204" pitchFamily="49" charset="0"/>
+              </a:rPr>
+              <a:t> </a:t>
+            </a:r>
+            <a:r>
+              <a:rPr lang="nl-NL" sz="2800" b="1" dirty="0" err="1" smtClean="0">
+                <a:solidFill>
+                  <a:srgbClr val="7F0055"/>
+                </a:solidFill>
+                <a:latin typeface="Consolas" panose="020B0609020204030204" pitchFamily="49" charset="0"/>
+                <a:cs typeface="Consolas" panose="020B0609020204030204" pitchFamily="49" charset="0"/>
+              </a:rPr>
+              <a:t>def</a:t>
+            </a:r>
+            <a:r>
+              <a:rPr lang="nl-NL" sz="2800" dirty="0" smtClean="0">
+                <a:solidFill>
+                  <a:srgbClr val="7F0055"/>
+                </a:solidFill>
+                <a:latin typeface="Consolas" panose="020B0609020204030204" pitchFamily="49" charset="0"/>
+                <a:cs typeface="Consolas" panose="020B0609020204030204" pitchFamily="49" charset="0"/>
+              </a:rPr>
+              <a:t> </a:t>
+            </a:r>
+            <a:r>
+              <a:rPr lang="nl-NL" sz="2800" dirty="0" err="1" smtClean="0">
+                <a:latin typeface="Consolas" panose="020B0609020204030204" pitchFamily="49" charset="0"/>
+                <a:cs typeface="Consolas" panose="020B0609020204030204" pitchFamily="49" charset="0"/>
+              </a:rPr>
+              <a:t>onNext</a:t>
+            </a:r>
+            <a:r>
+              <a:rPr lang="nl-NL" sz="2800" dirty="0" smtClean="0">
+                <a:latin typeface="Consolas" panose="020B0609020204030204" pitchFamily="49" charset="0"/>
+                <a:cs typeface="Consolas" panose="020B0609020204030204" pitchFamily="49" charset="0"/>
+              </a:rPr>
+              <a:t>(i: I) = </a:t>
+            </a:r>
+            <a:r>
+              <a:rPr lang="nl-NL" sz="2800" dirty="0" err="1" smtClean="0">
+                <a:solidFill>
+                  <a:srgbClr val="5E5EFF"/>
+                </a:solidFill>
+                <a:latin typeface="Consolas" panose="020B0609020204030204" pitchFamily="49" charset="0"/>
+                <a:cs typeface="Consolas" panose="020B0609020204030204" pitchFamily="49" charset="0"/>
+              </a:rPr>
+              <a:t>subject</a:t>
+            </a:r>
+            <a:r>
+              <a:rPr lang="nl-NL" sz="2800" dirty="0" err="1" smtClean="0">
+                <a:latin typeface="Consolas" panose="020B0609020204030204" pitchFamily="49" charset="0"/>
+                <a:cs typeface="Consolas" panose="020B0609020204030204" pitchFamily="49" charset="0"/>
+              </a:rPr>
+              <a:t>.onNext</a:t>
+            </a:r>
+            <a:r>
+              <a:rPr lang="nl-NL" sz="2800" dirty="0" smtClean="0">
+                <a:latin typeface="Consolas" panose="020B0609020204030204" pitchFamily="49" charset="0"/>
+                <a:cs typeface="Consolas" panose="020B0609020204030204" pitchFamily="49" charset="0"/>
+              </a:rPr>
+              <a:t>(i)</a:t>
+            </a:r>
+          </a:p>
+          <a:p>
+            <a:pPr marL="0" indent="0">
+              <a:buNone/>
+            </a:pPr>
+            <a:r>
+              <a:rPr lang="nl-NL" sz="2800" dirty="0" smtClean="0">
+                <a:latin typeface="Consolas" panose="020B0609020204030204" pitchFamily="49" charset="0"/>
+                <a:cs typeface="Consolas" panose="020B0609020204030204" pitchFamily="49" charset="0"/>
+              </a:rPr>
+              <a:t>  </a:t>
+            </a:r>
+            <a:r>
+              <a:rPr lang="nl-NL" sz="2800" b="1" dirty="0" err="1" smtClean="0">
+                <a:solidFill>
+                  <a:srgbClr val="7F0055"/>
+                </a:solidFill>
+                <a:latin typeface="Consolas" panose="020B0609020204030204" pitchFamily="49" charset="0"/>
+                <a:cs typeface="Consolas" panose="020B0609020204030204" pitchFamily="49" charset="0"/>
+              </a:rPr>
+              <a:t>override</a:t>
+            </a:r>
+            <a:r>
+              <a:rPr lang="nl-NL" sz="2800" b="1" dirty="0" smtClean="0">
+                <a:solidFill>
+                  <a:srgbClr val="7F0055"/>
+                </a:solidFill>
+                <a:latin typeface="Consolas" panose="020B0609020204030204" pitchFamily="49" charset="0"/>
+                <a:cs typeface="Consolas" panose="020B0609020204030204" pitchFamily="49" charset="0"/>
+              </a:rPr>
+              <a:t> </a:t>
+            </a:r>
+            <a:r>
+              <a:rPr lang="nl-NL" sz="2800" b="1" dirty="0" err="1" smtClean="0">
+                <a:solidFill>
+                  <a:srgbClr val="7F0055"/>
+                </a:solidFill>
+                <a:latin typeface="Consolas" panose="020B0609020204030204" pitchFamily="49" charset="0"/>
+                <a:cs typeface="Consolas" panose="020B0609020204030204" pitchFamily="49" charset="0"/>
+              </a:rPr>
+              <a:t>def</a:t>
+            </a:r>
+            <a:r>
+              <a:rPr lang="nl-NL" sz="2800" dirty="0" smtClean="0">
+                <a:solidFill>
+                  <a:srgbClr val="7F0055"/>
+                </a:solidFill>
+                <a:latin typeface="Consolas" panose="020B0609020204030204" pitchFamily="49" charset="0"/>
+                <a:cs typeface="Consolas" panose="020B0609020204030204" pitchFamily="49" charset="0"/>
+              </a:rPr>
+              <a:t> </a:t>
+            </a:r>
+            <a:r>
+              <a:rPr lang="nl-NL" sz="2800" dirty="0" err="1" smtClean="0">
+                <a:latin typeface="Consolas" panose="020B0609020204030204" pitchFamily="49" charset="0"/>
+                <a:cs typeface="Consolas" panose="020B0609020204030204" pitchFamily="49" charset="0"/>
+              </a:rPr>
+              <a:t>onError</a:t>
+            </a:r>
+            <a:r>
+              <a:rPr lang="nl-NL" sz="2800" dirty="0" smtClean="0">
+                <a:latin typeface="Consolas" panose="020B0609020204030204" pitchFamily="49" charset="0"/>
+                <a:cs typeface="Consolas" panose="020B0609020204030204" pitchFamily="49" charset="0"/>
+              </a:rPr>
+              <a:t>(e: </a:t>
+            </a:r>
+            <a:r>
+              <a:rPr lang="nl-NL" sz="2800" dirty="0" err="1" smtClean="0">
+                <a:latin typeface="Consolas" panose="020B0609020204030204" pitchFamily="49" charset="0"/>
+                <a:cs typeface="Consolas" panose="020B0609020204030204" pitchFamily="49" charset="0"/>
+              </a:rPr>
+              <a:t>Throwable</a:t>
+            </a:r>
+            <a:r>
+              <a:rPr lang="nl-NL" sz="2800" dirty="0" smtClean="0">
+                <a:latin typeface="Consolas" panose="020B0609020204030204" pitchFamily="49" charset="0"/>
+                <a:cs typeface="Consolas" panose="020B0609020204030204" pitchFamily="49" charset="0"/>
+              </a:rPr>
+              <a:t>) =</a:t>
+            </a:r>
+          </a:p>
+          <a:p>
+            <a:pPr marL="0" indent="0">
+              <a:buNone/>
+            </a:pPr>
+            <a:r>
+              <a:rPr lang="nl-NL" sz="2800" dirty="0">
+                <a:solidFill>
+                  <a:srgbClr val="5E5EFF"/>
+                </a:solidFill>
+                <a:latin typeface="Consolas" panose="020B0609020204030204" pitchFamily="49" charset="0"/>
+                <a:cs typeface="Consolas" panose="020B0609020204030204" pitchFamily="49" charset="0"/>
+              </a:rPr>
+              <a:t> </a:t>
+            </a:r>
+            <a:r>
+              <a:rPr lang="nl-NL" sz="2800" dirty="0" smtClean="0">
+                <a:solidFill>
+                  <a:srgbClr val="5E5EFF"/>
+                </a:solidFill>
+                <a:latin typeface="Consolas" panose="020B0609020204030204" pitchFamily="49" charset="0"/>
+                <a:cs typeface="Consolas" panose="020B0609020204030204" pitchFamily="49" charset="0"/>
+              </a:rPr>
+              <a:t>                             </a:t>
+            </a:r>
+            <a:r>
+              <a:rPr lang="nl-NL" sz="2800" dirty="0" err="1" smtClean="0">
+                <a:solidFill>
+                  <a:srgbClr val="5E5EFF"/>
+                </a:solidFill>
+                <a:latin typeface="Consolas" panose="020B0609020204030204" pitchFamily="49" charset="0"/>
+                <a:cs typeface="Consolas" panose="020B0609020204030204" pitchFamily="49" charset="0"/>
+              </a:rPr>
+              <a:t>subject</a:t>
+            </a:r>
+            <a:r>
+              <a:rPr lang="nl-NL" sz="2800" dirty="0" err="1" smtClean="0">
+                <a:latin typeface="Consolas" panose="020B0609020204030204" pitchFamily="49" charset="0"/>
+                <a:cs typeface="Consolas" panose="020B0609020204030204" pitchFamily="49" charset="0"/>
+              </a:rPr>
+              <a:t>.onError</a:t>
+            </a:r>
+            <a:r>
+              <a:rPr lang="nl-NL" sz="2800" dirty="0" smtClean="0">
+                <a:latin typeface="Consolas" panose="020B0609020204030204" pitchFamily="49" charset="0"/>
+                <a:cs typeface="Consolas" panose="020B0609020204030204" pitchFamily="49" charset="0"/>
+              </a:rPr>
+              <a:t>(e)</a:t>
+            </a:r>
+          </a:p>
+          <a:p>
+            <a:pPr marL="0" indent="0">
+              <a:buNone/>
+            </a:pPr>
+            <a:r>
+              <a:rPr lang="nl-NL" sz="2800" dirty="0" smtClean="0">
+                <a:latin typeface="Consolas" panose="020B0609020204030204" pitchFamily="49" charset="0"/>
+                <a:cs typeface="Consolas" panose="020B0609020204030204" pitchFamily="49" charset="0"/>
+              </a:rPr>
+              <a:t>  </a:t>
+            </a:r>
+            <a:r>
+              <a:rPr lang="nl-NL" sz="2800" b="1" dirty="0" err="1">
+                <a:solidFill>
+                  <a:srgbClr val="7F0055"/>
+                </a:solidFill>
+                <a:latin typeface="Consolas" panose="020B0609020204030204" pitchFamily="49" charset="0"/>
+                <a:cs typeface="Consolas" panose="020B0609020204030204" pitchFamily="49" charset="0"/>
+              </a:rPr>
+              <a:t>override</a:t>
+            </a:r>
+            <a:r>
+              <a:rPr lang="nl-NL" sz="2800" b="1" dirty="0">
+                <a:solidFill>
+                  <a:srgbClr val="7F0055"/>
+                </a:solidFill>
+                <a:latin typeface="Consolas" panose="020B0609020204030204" pitchFamily="49" charset="0"/>
+                <a:cs typeface="Consolas" panose="020B0609020204030204" pitchFamily="49" charset="0"/>
+              </a:rPr>
+              <a:t> </a:t>
+            </a:r>
+            <a:r>
+              <a:rPr lang="nl-NL" sz="2800" b="1" dirty="0" err="1" smtClean="0">
+                <a:solidFill>
+                  <a:srgbClr val="7F0055"/>
+                </a:solidFill>
+                <a:latin typeface="Consolas" panose="020B0609020204030204" pitchFamily="49" charset="0"/>
+                <a:cs typeface="Consolas" panose="020B0609020204030204" pitchFamily="49" charset="0"/>
+              </a:rPr>
+              <a:t>def</a:t>
+            </a:r>
+            <a:r>
+              <a:rPr lang="nl-NL" sz="2800" dirty="0" smtClean="0">
+                <a:solidFill>
+                  <a:srgbClr val="7F0055"/>
+                </a:solidFill>
+                <a:latin typeface="Consolas" panose="020B0609020204030204" pitchFamily="49" charset="0"/>
+                <a:cs typeface="Consolas" panose="020B0609020204030204" pitchFamily="49" charset="0"/>
+              </a:rPr>
+              <a:t> </a:t>
+            </a:r>
+            <a:r>
+              <a:rPr lang="nl-NL" sz="2800" dirty="0" err="1" smtClean="0">
+                <a:latin typeface="Consolas" panose="020B0609020204030204" pitchFamily="49" charset="0"/>
+                <a:cs typeface="Consolas" panose="020B0609020204030204" pitchFamily="49" charset="0"/>
+              </a:rPr>
+              <a:t>onCompleted</a:t>
+            </a:r>
+            <a:r>
+              <a:rPr lang="nl-NL" sz="2800" dirty="0">
+                <a:latin typeface="Consolas" panose="020B0609020204030204" pitchFamily="49" charset="0"/>
+                <a:cs typeface="Consolas" panose="020B0609020204030204" pitchFamily="49" charset="0"/>
+              </a:rPr>
+              <a:t> </a:t>
+            </a:r>
+            <a:r>
+              <a:rPr lang="nl-NL" sz="2800" dirty="0" smtClean="0">
+                <a:latin typeface="Consolas" panose="020B0609020204030204" pitchFamily="49" charset="0"/>
+                <a:cs typeface="Consolas" panose="020B0609020204030204" pitchFamily="49" charset="0"/>
+              </a:rPr>
+              <a:t>= </a:t>
+            </a:r>
+            <a:r>
+              <a:rPr lang="nl-NL" sz="2800" dirty="0" err="1" smtClean="0">
+                <a:solidFill>
+                  <a:srgbClr val="5E5EFF"/>
+                </a:solidFill>
+                <a:latin typeface="Consolas" panose="020B0609020204030204" pitchFamily="49" charset="0"/>
+                <a:cs typeface="Consolas" panose="020B0609020204030204" pitchFamily="49" charset="0"/>
+              </a:rPr>
+              <a:t>subject</a:t>
+            </a:r>
+            <a:r>
+              <a:rPr lang="nl-NL" sz="2800" dirty="0" err="1" smtClean="0">
+                <a:latin typeface="Consolas" panose="020B0609020204030204" pitchFamily="49" charset="0"/>
+                <a:cs typeface="Consolas" panose="020B0609020204030204" pitchFamily="49" charset="0"/>
+              </a:rPr>
+              <a:t>.onCompleted</a:t>
+            </a:r>
+            <a:endParaRPr lang="nl-NL" sz="2800" dirty="0">
+              <a:latin typeface="Consolas" panose="020B0609020204030204" pitchFamily="49" charset="0"/>
+              <a:cs typeface="Consolas" panose="020B0609020204030204" pitchFamily="49" charset="0"/>
+            </a:endParaRPr>
+          </a:p>
+          <a:p>
+            <a:pPr marL="0" indent="0">
+              <a:buNone/>
+            </a:pPr>
+            <a:r>
+              <a:rPr lang="nl-NL" sz="2800" dirty="0">
+                <a:latin typeface="Consolas" panose="020B0609020204030204" pitchFamily="49" charset="0"/>
+                <a:cs typeface="Consolas" panose="020B0609020204030204" pitchFamily="49" charset="0"/>
+              </a:rPr>
+              <a:t>}</a:t>
+            </a:r>
+            <a:endParaRPr lang="nl-NL" sz="2800" b="1" dirty="0">
+              <a:solidFill>
+                <a:srgbClr val="3F7F5F"/>
+              </a:solidFill>
+              <a:latin typeface="Consolas" panose="020B0609020204030204" pitchFamily="49" charset="0"/>
+              <a:cs typeface="Consolas" panose="020B0609020204030204" pitchFamily="49" charset="0"/>
+            </a:endParaRPr>
+          </a:p>
+        </p:txBody>
+      </p:sp>
+      <p:sp>
+        <p:nvSpPr>
+          <p:cNvPr id="7" name="Titel 3"/>
+          <p:cNvSpPr txBox="1">
+            <a:spLocks/>
+          </p:cNvSpPr>
+          <p:nvPr/>
+        </p:nvSpPr>
+        <p:spPr>
+          <a:xfrm>
+            <a:off x="457200" y="116632"/>
+            <a:ext cx="8229600" cy="720080"/>
+          </a:xfrm>
+          <a:prstGeom prst="rect">
+            <a:avLst/>
+          </a:prstGeom>
+        </p:spPr>
+        <p:txBody>
+          <a:bodyPr vert="horz" lIns="91440" tIns="45720" rIns="91440" bIns="45720" rtlCol="0" anchor="ctr">
+            <a:normAutofit lnSpcReduction="10000"/>
+          </a:bodyPr>
+          <a:lstStyle>
+            <a:lvl1pPr algn="ctr" defTabSz="914400" rtl="0" eaLnBrk="1" latinLnBrk="0" hangingPunct="1">
+              <a:spcBef>
+                <a:spcPct val="0"/>
+              </a:spcBef>
+              <a:buNone/>
+              <a:defRPr sz="4400" kern="1200">
+                <a:solidFill>
+                  <a:schemeClr val="tx1"/>
+                </a:solidFill>
+                <a:latin typeface="+mj-lt"/>
+                <a:ea typeface="+mj-ea"/>
+                <a:cs typeface="+mj-cs"/>
+              </a:defRPr>
+            </a:lvl1pPr>
+          </a:lstStyle>
+          <a:p>
+            <a:r>
+              <a:rPr lang="nl-NL" dirty="0" err="1" smtClean="0"/>
+              <a:t>Derivation</a:t>
+            </a:r>
+            <a:r>
+              <a:rPr lang="nl-NL" dirty="0" smtClean="0"/>
+              <a:t> </a:t>
+            </a:r>
+            <a:r>
+              <a:rPr lang="nl-NL" sz="3600" dirty="0" smtClean="0">
+                <a:latin typeface="Consolas" panose="020B0609020204030204" pitchFamily="49" charset="0"/>
+                <a:cs typeface="Consolas" panose="020B0609020204030204" pitchFamily="49" charset="0"/>
+              </a:rPr>
+              <a:t>Component</a:t>
+            </a:r>
+            <a:r>
+              <a:rPr lang="nl-NL" dirty="0" smtClean="0"/>
               <a:t> interface</a:t>
             </a:r>
             <a:endParaRPr lang="nl-NL" dirty="0"/>
@@ -10553,7 +12810,7 @@
 </p:sld>
 </file>
 
-<file path=ppt/slides/slide23.xml><?xml version="1.0" encoding="utf-8"?>
+<file path=ppt/slides/slide27.xml><?xml version="1.0" encoding="utf-8"?>
 <p:sld xmlns:a="http://schemas.openxmlformats.org/drawingml/2006/main" xmlns:r="http://schemas.openxmlformats.org/officeDocument/2006/relationships" xmlns:p="http://schemas.openxmlformats.org/presentationml/2006/main">
   <p:cSld>
     <p:spTree>
@@ -12021,8 +14278,8 @@
           <a:chExt cx="0" cy="0"/>
         </a:xfrm>
       </p:grpSpPr>
-      <mc:AlternateContent xmlns:mc="http://schemas.openxmlformats.org/markup-compatibility/2006" xmlns:a14="http://schemas.microsoft.com/office/drawing/2010/main">
-        <mc:Choice Requires="a14">
+      <mc:AlternateContent xmlns:mc="http://schemas.openxmlformats.org/markup-compatibility/2006">
+        <mc:Choice xmlns:a14="http://schemas.microsoft.com/office/drawing/2010/main" Requires="a14">
           <p:sp>
             <p:nvSpPr>
               <p:cNvPr id="5" name="Tijdelijke aanduiding voor inhoud 4"/>
@@ -12230,7 +14487,17 @@
                     <a:latin typeface="Consolas" panose="020B0609020204030204" pitchFamily="49" charset="0"/>
                     <a:cs typeface="Consolas" panose="020B0609020204030204" pitchFamily="49" charset="0"/>
                   </a:rPr>
-                  <a:t> in a object</a:t>
+                  <a:t> in a </a:t>
+                </a:r>
+                <a:r>
+                  <a:rPr lang="nl-NL" sz="2800" dirty="0" err="1" smtClean="0">
+                    <a:solidFill>
+                      <a:srgbClr val="3F7F5F"/>
+                    </a:solidFill>
+                    <a:latin typeface="Consolas" panose="020B0609020204030204" pitchFamily="49" charset="0"/>
+                    <a:cs typeface="Consolas" panose="020B0609020204030204" pitchFamily="49" charset="0"/>
+                  </a:rPr>
+                  <a:t>trait</a:t>
                 </a:r>
                 <a:endParaRPr lang="nl-NL" sz="2800" dirty="0">
                   <a:solidFill>
@@ -12245,14 +14512,14 @@
                   <a:buNone/>
                 </a:pPr>
                 <a:r>
-                  <a:rPr lang="nl-NL" sz="2800" b="1" dirty="0" smtClean="0">
+                  <a:rPr lang="nl-NL" sz="2800" b="1" dirty="0" err="1" smtClean="0">
                     <a:solidFill>
                       <a:srgbClr val="7F0055"/>
                     </a:solidFill>
                     <a:latin typeface="Consolas" panose="020B0609020204030204" pitchFamily="49" charset="0"/>
                     <a:cs typeface="Consolas" panose="020B0609020204030204" pitchFamily="49" charset="0"/>
                   </a:rPr>
-                  <a:t>object</a:t>
+                  <a:t>trait</a:t>
                 </a:r>
                 <a:r>
                   <a:rPr lang="nl-NL" sz="2800" dirty="0" smtClean="0">
@@ -12269,7 +14536,7 @@
                     <a:latin typeface="Consolas" panose="020B0609020204030204" pitchFamily="49" charset="0"/>
                     <a:cs typeface="Consolas" panose="020B0609020204030204" pitchFamily="49" charset="0"/>
                   </a:rPr>
-                  <a:t>Component </a:t>
+                  <a:t>Component[I, O, S] </a:t>
                 </a:r>
                 <a:r>
                   <a:rPr lang="nl-NL" sz="2800" dirty="0">
@@ -12315,21 +14582,14 @@
                     <a:latin typeface="Consolas" panose="020B0609020204030204" pitchFamily="49" charset="0"/>
                     <a:cs typeface="Consolas" panose="020B0609020204030204" pitchFamily="49" charset="0"/>
                   </a:rPr>
-                  <a:t>update</a:t>
-                </a:r>
-                <a:r>
-                  <a:rPr lang="nl-NL" sz="2800" dirty="0">
-                    <a:latin typeface="Consolas" panose="020B0609020204030204" pitchFamily="49" charset="0"/>
-                    <a:cs typeface="Consolas" panose="020B0609020204030204" pitchFamily="49" charset="0"/>
-                  </a:rPr>
-                  <a:t>[I, O, S</a:t>
+                  <a:t>update(s</a:t>
                 </a:r>
                 <a:r>
                   <a:rPr lang="nl-NL" sz="2800" dirty="0" smtClean="0">
                     <a:latin typeface="Consolas" panose="020B0609020204030204" pitchFamily="49" charset="0"/>
                     <a:cs typeface="Consolas" panose="020B0609020204030204" pitchFamily="49" charset="0"/>
                   </a:rPr>
-                  <a:t>](s: S, i</a:t>
+                  <a:t>: S, i</a:t>
                 </a:r>
                 <a:r>
                   <a:rPr lang="nl-NL" sz="2800" dirty="0">
@@ -12369,17 +14629,27 @@
                     <a:latin typeface="Consolas" panose="020B0609020204030204" pitchFamily="49" charset="0"/>
                     <a:cs typeface="Consolas" panose="020B0609020204030204" pitchFamily="49" charset="0"/>
                   </a:rPr>
-                  <a:t>// store state in Component </a:t>
+                  <a:t>// store state </a:t>
                 </a:r>
                 <a:r>
-                  <a:rPr lang="nl-NL" sz="2800" b="1" dirty="0" err="1" smtClean="0">
+                  <a:rPr lang="nl-NL" sz="2800" dirty="0" err="1" smtClean="0">
                     <a:solidFill>
                       <a:srgbClr val="3F7F5F"/>
                     </a:solidFill>
                     <a:latin typeface="Consolas" panose="020B0609020204030204" pitchFamily="49" charset="0"/>
                     <a:cs typeface="Consolas" panose="020B0609020204030204" pitchFamily="49" charset="0"/>
                   </a:rPr>
-                  <a:t>trait</a:t>
+                  <a:t>somewhere</a:t>
+                </a:r>
+                <a:r>
+                  <a:rPr lang="nl-NL" sz="2800" dirty="0" smtClean="0">
+                    <a:solidFill>
+                      <a:srgbClr val="3F7F5F"/>
+                    </a:solidFill>
+                    <a:latin typeface="Consolas" panose="020B0609020204030204" pitchFamily="49" charset="0"/>
+                    <a:cs typeface="Consolas" panose="020B0609020204030204" pitchFamily="49" charset="0"/>
+                  </a:rPr>
+                  <a:t> in Component</a:t>
                 </a:r>
                 <a:endParaRPr lang="nl-NL" sz="2800" b="1" dirty="0" smtClean="0">
                   <a:solidFill>
@@ -12526,7 +14796,7 @@
             </p:txBody>
           </p:sp>
         </mc:Choice>
-        <mc:Fallback xmlns="">
+        <mc:Fallback>
           <p:sp>
             <p:nvSpPr>
               <p:cNvPr id="5" name="Tijdelijke aanduiding voor inhoud 4"/>
@@ -13753,14 +16023,7 @@
                 <a:latin typeface="Consolas" panose="020B0609020204030204" pitchFamily="49" charset="0"/>
                 <a:cs typeface="Consolas" panose="020B0609020204030204" pitchFamily="49" charset="0"/>
               </a:rPr>
-              <a:t> </a:t>
-            </a:r>
-            <a:r>
-              <a:rPr lang="nl-NL" sz="2400" dirty="0" smtClean="0">
-                <a:latin typeface="Consolas" panose="020B0609020204030204" pitchFamily="49" charset="0"/>
-                <a:cs typeface="Consolas" panose="020B0609020204030204" pitchFamily="49" charset="0"/>
-              </a:rPr>
-              <a:t>== </a:t>
+              <a:t> == </a:t>
             </a:r>
             <a:r>
               <a:rPr lang="nl-NL" sz="2400" dirty="0">

</xml_diff>